<commit_message>
final version of pptx
</commit_message>
<xml_diff>
--- a/Mid Semester Presentation.pptx
+++ b/Mid Semester Presentation.pptx
@@ -2,28 +2,30 @@
 <file path=ppt/presentation.xml><?xml version="1.0" encoding="utf-8"?>
 <p:presentation xmlns:a="http://schemas.openxmlformats.org/drawingml/2006/main" xmlns:r="http://schemas.openxmlformats.org/officeDocument/2006/relationships" xmlns:p="http://schemas.openxmlformats.org/presentationml/2006/main" saveSubsetFonts="1">
   <p:sldMasterIdLst>
-    <p:sldMasterId id="2147483672" r:id="rId1"/>
+    <p:sldMasterId id="2147483696" r:id="rId1"/>
   </p:sldMasterIdLst>
   <p:notesMasterIdLst>
-    <p:notesMasterId r:id="rId18"/>
+    <p:notesMasterId r:id="rId20"/>
   </p:notesMasterIdLst>
   <p:sldIdLst>
     <p:sldId id="256" r:id="rId2"/>
     <p:sldId id="261" r:id="rId3"/>
-    <p:sldId id="269" r:id="rId4"/>
-    <p:sldId id="264" r:id="rId5"/>
-    <p:sldId id="268" r:id="rId6"/>
-    <p:sldId id="262" r:id="rId7"/>
-    <p:sldId id="274" r:id="rId8"/>
-    <p:sldId id="270" r:id="rId9"/>
-    <p:sldId id="272" r:id="rId10"/>
-    <p:sldId id="273" r:id="rId11"/>
-    <p:sldId id="267" r:id="rId12"/>
-    <p:sldId id="271" r:id="rId13"/>
-    <p:sldId id="275" r:id="rId14"/>
-    <p:sldId id="257" r:id="rId15"/>
-    <p:sldId id="259" r:id="rId16"/>
-    <p:sldId id="266" r:id="rId17"/>
+    <p:sldId id="276" r:id="rId4"/>
+    <p:sldId id="269" r:id="rId5"/>
+    <p:sldId id="264" r:id="rId6"/>
+    <p:sldId id="268" r:id="rId7"/>
+    <p:sldId id="262" r:id="rId8"/>
+    <p:sldId id="274" r:id="rId9"/>
+    <p:sldId id="270" r:id="rId10"/>
+    <p:sldId id="272" r:id="rId11"/>
+    <p:sldId id="273" r:id="rId12"/>
+    <p:sldId id="267" r:id="rId13"/>
+    <p:sldId id="271" r:id="rId14"/>
+    <p:sldId id="275" r:id="rId15"/>
+    <p:sldId id="257" r:id="rId16"/>
+    <p:sldId id="259" r:id="rId17"/>
+    <p:sldId id="266" r:id="rId18"/>
+    <p:sldId id="277" r:id="rId19"/>
   </p:sldIdLst>
   <p:sldSz cx="12192000" cy="6858000"/>
   <p:notesSz cx="6858000" cy="9144000"/>
@@ -220,7 +222,7 @@
           <a:p>
             <a:fld id="{BAA960FA-F8F2-8342-92CA-A28CCF2F2744}" type="datetimeFigureOut">
               <a:rPr lang="en-US" smtClean="0"/>
-              <a:t>10/24/2018</a:t>
+              <a:t>10/25/2018</a:t>
             </a:fld>
             <a:endParaRPr lang="en-US"/>
           </a:p>
@@ -644,7 +646,7 @@
           <a:p>
             <a:fld id="{53997451-DD4C-6845-B353-833DB10F4ADA}" type="slidenum">
               <a:rPr lang="en-US" smtClean="0"/>
-              <a:t>3</a:t>
+              <a:t>4</a:t>
             </a:fld>
             <a:endParaRPr lang="en-US"/>
           </a:p>
@@ -731,7 +733,7 @@
           <a:p>
             <a:fld id="{53997451-DD4C-6845-B353-833DB10F4ADA}" type="slidenum">
               <a:rPr lang="en-US" smtClean="0"/>
-              <a:t>4</a:t>
+              <a:t>5</a:t>
             </a:fld>
             <a:endParaRPr lang="en-US"/>
           </a:p>
@@ -823,7 +825,7 @@
           <a:p>
             <a:fld id="{53997451-DD4C-6845-B353-833DB10F4ADA}" type="slidenum">
               <a:rPr lang="en-US" smtClean="0"/>
-              <a:t>5</a:t>
+              <a:t>6</a:t>
             </a:fld>
             <a:endParaRPr lang="en-US"/>
           </a:p>
@@ -918,7 +920,7 @@
           <a:p>
             <a:fld id="{53997451-DD4C-6845-B353-833DB10F4ADA}" type="slidenum">
               <a:rPr lang="en-US" smtClean="0"/>
-              <a:t>6</a:t>
+              <a:t>7</a:t>
             </a:fld>
             <a:endParaRPr lang="en-US"/>
           </a:p>
@@ -1018,7 +1020,7 @@
           <a:p>
             <a:fld id="{53997451-DD4C-6845-B353-833DB10F4ADA}" type="slidenum">
               <a:rPr lang="en-US" smtClean="0"/>
-              <a:t>8</a:t>
+              <a:t>9</a:t>
             </a:fld>
             <a:endParaRPr lang="en-US"/>
           </a:p>
@@ -1118,7 +1120,7 @@
           <a:p>
             <a:fld id="{53997451-DD4C-6845-B353-833DB10F4ADA}" type="slidenum">
               <a:rPr lang="en-US" smtClean="0"/>
-              <a:t>16</a:t>
+              <a:t>17</a:t>
             </a:fld>
             <a:endParaRPr lang="en-US"/>
           </a:p>
@@ -1159,7 +1161,7 @@
           <p:cNvPr id="2" name="Title 1">
             <a:extLst>
               <a:ext uri="{FF2B5EF4-FFF2-40B4-BE49-F238E27FC236}">
-                <a16:creationId xmlns:a16="http://schemas.microsoft.com/office/drawing/2014/main" id="{B8B3E9FE-347F-4AA7-B5D0-2966CC58A8C0}"/>
+                <a16:creationId xmlns:a16="http://schemas.microsoft.com/office/drawing/2014/main" id="{B32BD684-9960-4710-AFCC-716D94063E95}"/>
               </a:ext>
             </a:extLst>
           </p:cNvPr>
@@ -1180,7 +1182,9 @@
           <a:bodyPr anchor="b"/>
           <a:lstStyle>
             <a:lvl1pPr algn="ctr">
-              <a:defRPr sz="6000"/>
+              <a:defRPr sz="6000">
+                <a:latin typeface="Bahnschrift" panose="020B0502040204020203" pitchFamily="34" charset="0"/>
+              </a:defRPr>
             </a:lvl1pPr>
           </a:lstStyle>
           <a:p>
@@ -1196,7 +1200,7 @@
           <p:cNvPr id="3" name="Subtitle 2">
             <a:extLst>
               <a:ext uri="{FF2B5EF4-FFF2-40B4-BE49-F238E27FC236}">
-                <a16:creationId xmlns:a16="http://schemas.microsoft.com/office/drawing/2014/main" id="{85C5580E-3F1C-4A9A-84E1-44EE3481C1C0}"/>
+                <a16:creationId xmlns:a16="http://schemas.microsoft.com/office/drawing/2014/main" id="{7699D10A-223E-446A-BD73-587C8BD378FE}"/>
               </a:ext>
             </a:extLst>
           </p:cNvPr>
@@ -1218,7 +1222,9 @@
           <a:lstStyle>
             <a:lvl1pPr marL="0" indent="0" algn="ctr">
               <a:buNone/>
-              <a:defRPr sz="2400"/>
+              <a:defRPr sz="2400">
+                <a:latin typeface="Bahnschrift" panose="020B0502040204020203" pitchFamily="34" charset="0"/>
+              </a:defRPr>
             </a:lvl1pPr>
             <a:lvl2pPr marL="457200" indent="0" algn="ctr">
               <a:buNone/>
@@ -1266,7 +1272,7 @@
           <p:cNvPr id="4" name="Date Placeholder 3">
             <a:extLst>
               <a:ext uri="{FF2B5EF4-FFF2-40B4-BE49-F238E27FC236}">
-                <a16:creationId xmlns:a16="http://schemas.microsoft.com/office/drawing/2014/main" id="{7BE380AA-CCC0-4FA7-9C4E-EA2984862757}"/>
+                <a16:creationId xmlns:a16="http://schemas.microsoft.com/office/drawing/2014/main" id="{47854030-5DDB-4B2A-A339-D70D14B3219C}"/>
               </a:ext>
             </a:extLst>
           </p:cNvPr>
@@ -1284,7 +1290,7 @@
           <a:p>
             <a:fld id="{43CEAD56-E5CE-4A48-BE26-3F874B3EFFB2}" type="datetimeFigureOut">
               <a:rPr lang="en-US" smtClean="0"/>
-              <a:t>10/24/2018</a:t>
+              <a:t>10/25/2018</a:t>
             </a:fld>
             <a:endParaRPr lang="en-US"/>
           </a:p>
@@ -1295,7 +1301,7 @@
           <p:cNvPr id="5" name="Footer Placeholder 4">
             <a:extLst>
               <a:ext uri="{FF2B5EF4-FFF2-40B4-BE49-F238E27FC236}">
-                <a16:creationId xmlns:a16="http://schemas.microsoft.com/office/drawing/2014/main" id="{10735B48-001C-49CB-84DC-99D2695978DF}"/>
+                <a16:creationId xmlns:a16="http://schemas.microsoft.com/office/drawing/2014/main" id="{86C4DF1F-40E1-4941-8613-2182A8D1BB06}"/>
               </a:ext>
             </a:extLst>
           </p:cNvPr>
@@ -1320,7 +1326,7 @@
           <p:cNvPr id="6" name="Slide Number Placeholder 5">
             <a:extLst>
               <a:ext uri="{FF2B5EF4-FFF2-40B4-BE49-F238E27FC236}">
-                <a16:creationId xmlns:a16="http://schemas.microsoft.com/office/drawing/2014/main" id="{5D18854D-1F70-4998-A8C0-77FFEFD9D99A}"/>
+                <a16:creationId xmlns:a16="http://schemas.microsoft.com/office/drawing/2014/main" id="{79803115-496D-4124-835B-1B13337C7ADA}"/>
               </a:ext>
             </a:extLst>
           </p:cNvPr>
@@ -1347,7 +1353,7 @@
     </p:spTree>
     <p:extLst>
       <p:ext uri="{BB962C8B-B14F-4D97-AF65-F5344CB8AC3E}">
-        <p14:creationId xmlns:p14="http://schemas.microsoft.com/office/powerpoint/2010/main" val="3292973654"/>
+        <p14:creationId xmlns:p14="http://schemas.microsoft.com/office/powerpoint/2010/main" val="2777549979"/>
       </p:ext>
     </p:extLst>
   </p:cSld>
@@ -1379,7 +1385,7 @@
           <p:cNvPr id="2" name="Title 1">
             <a:extLst>
               <a:ext uri="{FF2B5EF4-FFF2-40B4-BE49-F238E27FC236}">
-                <a16:creationId xmlns:a16="http://schemas.microsoft.com/office/drawing/2014/main" id="{298D67BC-E415-4F07-8E15-F1E0C8FE2EFA}"/>
+                <a16:creationId xmlns:a16="http://schemas.microsoft.com/office/drawing/2014/main" id="{D3A5977B-9833-40F6-8CAA-D94F62DD3653}"/>
               </a:ext>
             </a:extLst>
           </p:cNvPr>
@@ -1407,7 +1413,7 @@
           <p:cNvPr id="3" name="Vertical Text Placeholder 2">
             <a:extLst>
               <a:ext uri="{FF2B5EF4-FFF2-40B4-BE49-F238E27FC236}">
-                <a16:creationId xmlns:a16="http://schemas.microsoft.com/office/drawing/2014/main" id="{C0E76AB9-B45F-4D8A-AEC8-2D287D76CF12}"/>
+                <a16:creationId xmlns:a16="http://schemas.microsoft.com/office/drawing/2014/main" id="{C96AD966-59ED-4DE1-8ECF-1B4B4CF6B671}"/>
               </a:ext>
             </a:extLst>
           </p:cNvPr>
@@ -1464,7 +1470,7 @@
           <p:cNvPr id="4" name="Date Placeholder 3">
             <a:extLst>
               <a:ext uri="{FF2B5EF4-FFF2-40B4-BE49-F238E27FC236}">
-                <a16:creationId xmlns:a16="http://schemas.microsoft.com/office/drawing/2014/main" id="{286872AA-386D-49F0-8CAE-2FB0C7E0CB2E}"/>
+                <a16:creationId xmlns:a16="http://schemas.microsoft.com/office/drawing/2014/main" id="{7E3334FD-A943-46AB-9FF6-7833D6464E5E}"/>
               </a:ext>
             </a:extLst>
           </p:cNvPr>
@@ -1482,7 +1488,7 @@
           <a:p>
             <a:fld id="{43CEAD56-E5CE-4A48-BE26-3F874B3EFFB2}" type="datetimeFigureOut">
               <a:rPr lang="en-US" smtClean="0"/>
-              <a:t>10/24/2018</a:t>
+              <a:t>10/25/2018</a:t>
             </a:fld>
             <a:endParaRPr lang="en-US"/>
           </a:p>
@@ -1493,7 +1499,7 @@
           <p:cNvPr id="5" name="Footer Placeholder 4">
             <a:extLst>
               <a:ext uri="{FF2B5EF4-FFF2-40B4-BE49-F238E27FC236}">
-                <a16:creationId xmlns:a16="http://schemas.microsoft.com/office/drawing/2014/main" id="{9DC01DDE-A963-4484-8462-77D4C35F70D9}"/>
+                <a16:creationId xmlns:a16="http://schemas.microsoft.com/office/drawing/2014/main" id="{71106AED-B522-4ABE-B1D2-52CCC3130CE5}"/>
               </a:ext>
             </a:extLst>
           </p:cNvPr>
@@ -1518,7 +1524,7 @@
           <p:cNvPr id="6" name="Slide Number Placeholder 5">
             <a:extLst>
               <a:ext uri="{FF2B5EF4-FFF2-40B4-BE49-F238E27FC236}">
-                <a16:creationId xmlns:a16="http://schemas.microsoft.com/office/drawing/2014/main" id="{DAB58AA0-543C-4042-B5E0-7AD43CC32E4D}"/>
+                <a16:creationId xmlns:a16="http://schemas.microsoft.com/office/drawing/2014/main" id="{A9AA2E61-4845-444E-A3ED-5D1C54272B4B}"/>
               </a:ext>
             </a:extLst>
           </p:cNvPr>
@@ -1545,7 +1551,7 @@
     </p:spTree>
     <p:extLst>
       <p:ext uri="{BB962C8B-B14F-4D97-AF65-F5344CB8AC3E}">
-        <p14:creationId xmlns:p14="http://schemas.microsoft.com/office/powerpoint/2010/main" val="2709421034"/>
+        <p14:creationId xmlns:p14="http://schemas.microsoft.com/office/powerpoint/2010/main" val="1500033776"/>
       </p:ext>
     </p:extLst>
   </p:cSld>
@@ -1577,7 +1583,7 @@
           <p:cNvPr id="2" name="Vertical Title 1">
             <a:extLst>
               <a:ext uri="{FF2B5EF4-FFF2-40B4-BE49-F238E27FC236}">
-                <a16:creationId xmlns:a16="http://schemas.microsoft.com/office/drawing/2014/main" id="{70845774-C8D6-4CAB-A2F4-9D474CBB2AE3}"/>
+                <a16:creationId xmlns:a16="http://schemas.microsoft.com/office/drawing/2014/main" id="{0FE34143-25A3-41A7-A795-33F64F5A276C}"/>
               </a:ext>
             </a:extLst>
           </p:cNvPr>
@@ -1610,7 +1616,7 @@
           <p:cNvPr id="3" name="Vertical Text Placeholder 2">
             <a:extLst>
               <a:ext uri="{FF2B5EF4-FFF2-40B4-BE49-F238E27FC236}">
-                <a16:creationId xmlns:a16="http://schemas.microsoft.com/office/drawing/2014/main" id="{BA3E64F6-6D7C-41E5-861C-FB405CC610B3}"/>
+                <a16:creationId xmlns:a16="http://schemas.microsoft.com/office/drawing/2014/main" id="{25822171-E004-4275-8647-0923AF1C40E4}"/>
               </a:ext>
             </a:extLst>
           </p:cNvPr>
@@ -1672,7 +1678,7 @@
           <p:cNvPr id="4" name="Date Placeholder 3">
             <a:extLst>
               <a:ext uri="{FF2B5EF4-FFF2-40B4-BE49-F238E27FC236}">
-                <a16:creationId xmlns:a16="http://schemas.microsoft.com/office/drawing/2014/main" id="{E8F78E00-DF1A-43CF-BBBB-84B645B400B5}"/>
+                <a16:creationId xmlns:a16="http://schemas.microsoft.com/office/drawing/2014/main" id="{A8B89405-9274-457B-934C-C11D3D728245}"/>
               </a:ext>
             </a:extLst>
           </p:cNvPr>
@@ -1690,7 +1696,7 @@
           <a:p>
             <a:fld id="{43CEAD56-E5CE-4A48-BE26-3F874B3EFFB2}" type="datetimeFigureOut">
               <a:rPr lang="en-US" smtClean="0"/>
-              <a:t>10/24/2018</a:t>
+              <a:t>10/25/2018</a:t>
             </a:fld>
             <a:endParaRPr lang="en-US"/>
           </a:p>
@@ -1701,7 +1707,7 @@
           <p:cNvPr id="5" name="Footer Placeholder 4">
             <a:extLst>
               <a:ext uri="{FF2B5EF4-FFF2-40B4-BE49-F238E27FC236}">
-                <a16:creationId xmlns:a16="http://schemas.microsoft.com/office/drawing/2014/main" id="{80A8A1CF-EDAE-424B-8971-0025DE80DE09}"/>
+                <a16:creationId xmlns:a16="http://schemas.microsoft.com/office/drawing/2014/main" id="{B0128D3E-2F1B-45EF-A1F7-CCF3E4B3BF55}"/>
               </a:ext>
             </a:extLst>
           </p:cNvPr>
@@ -1726,7 +1732,7 @@
           <p:cNvPr id="6" name="Slide Number Placeholder 5">
             <a:extLst>
               <a:ext uri="{FF2B5EF4-FFF2-40B4-BE49-F238E27FC236}">
-                <a16:creationId xmlns:a16="http://schemas.microsoft.com/office/drawing/2014/main" id="{C8F4ADAF-C15A-41C3-8BEF-CB2E5B0B3B17}"/>
+                <a16:creationId xmlns:a16="http://schemas.microsoft.com/office/drawing/2014/main" id="{CFF90C26-677E-4EE7-B2A7-7BB86EEFE14A}"/>
               </a:ext>
             </a:extLst>
           </p:cNvPr>
@@ -1753,7 +1759,7 @@
     </p:spTree>
     <p:extLst>
       <p:ext uri="{BB962C8B-B14F-4D97-AF65-F5344CB8AC3E}">
-        <p14:creationId xmlns:p14="http://schemas.microsoft.com/office/powerpoint/2010/main" val="2370825056"/>
+        <p14:creationId xmlns:p14="http://schemas.microsoft.com/office/powerpoint/2010/main" val="2476131830"/>
       </p:ext>
     </p:extLst>
   </p:cSld>
@@ -1785,7 +1791,7 @@
           <p:cNvPr id="2" name="Title 1">
             <a:extLst>
               <a:ext uri="{FF2B5EF4-FFF2-40B4-BE49-F238E27FC236}">
-                <a16:creationId xmlns:a16="http://schemas.microsoft.com/office/drawing/2014/main" id="{C5D053B8-0E96-4A96-955D-54A151644769}"/>
+                <a16:creationId xmlns:a16="http://schemas.microsoft.com/office/drawing/2014/main" id="{3BA43CAC-8101-4C91-A669-80C0980990EC}"/>
               </a:ext>
             </a:extLst>
           </p:cNvPr>
@@ -1796,15 +1802,16 @@
             <p:ph type="title"/>
           </p:nvPr>
         </p:nvSpPr>
-        <p:spPr>
-          <a:xfrm>
-            <a:off x="838200" y="365126"/>
-            <a:ext cx="10515600" cy="950328"/>
-          </a:xfrm>
-        </p:spPr>
+        <p:spPr/>
         <p:txBody>
           <a:bodyPr/>
-          <a:lstStyle/>
+          <a:lstStyle>
+            <a:lvl1pPr>
+              <a:defRPr>
+                <a:latin typeface="Bahnschrift" panose="020B0502040204020203" pitchFamily="34" charset="0"/>
+              </a:defRPr>
+            </a:lvl1pPr>
+          </a:lstStyle>
           <a:p>
             <a:r>
               <a:rPr lang="en-US"/>
@@ -1818,7 +1825,7 @@
           <p:cNvPr id="3" name="Content Placeholder 2">
             <a:extLst>
               <a:ext uri="{FF2B5EF4-FFF2-40B4-BE49-F238E27FC236}">
-                <a16:creationId xmlns:a16="http://schemas.microsoft.com/office/drawing/2014/main" id="{6C11D560-0399-4A07-91FA-0ED96ED01D2E}"/>
+                <a16:creationId xmlns:a16="http://schemas.microsoft.com/office/drawing/2014/main" id="{8FBB33BC-6595-4BDF-84BF-3A09AB66341F}"/>
               </a:ext>
             </a:extLst>
           </p:cNvPr>
@@ -1829,15 +1836,36 @@
             <p:ph idx="1"/>
           </p:nvPr>
         </p:nvSpPr>
-        <p:spPr>
-          <a:xfrm>
-            <a:off x="838200" y="1472701"/>
-            <a:ext cx="10515600" cy="4351338"/>
-          </a:xfrm>
-        </p:spPr>
+        <p:spPr/>
         <p:txBody>
           <a:bodyPr/>
-          <a:lstStyle/>
+          <a:lstStyle>
+            <a:lvl1pPr>
+              <a:defRPr>
+                <a:latin typeface="Bahnschrift" panose="020B0502040204020203" pitchFamily="34" charset="0"/>
+              </a:defRPr>
+            </a:lvl1pPr>
+            <a:lvl2pPr>
+              <a:defRPr>
+                <a:latin typeface="Bahnschrift" panose="020B0502040204020203" pitchFamily="34" charset="0"/>
+              </a:defRPr>
+            </a:lvl2pPr>
+            <a:lvl3pPr>
+              <a:defRPr>
+                <a:latin typeface="Bahnschrift" panose="020B0502040204020203" pitchFamily="34" charset="0"/>
+              </a:defRPr>
+            </a:lvl3pPr>
+            <a:lvl4pPr>
+              <a:defRPr>
+                <a:latin typeface="Bahnschrift" panose="020B0502040204020203" pitchFamily="34" charset="0"/>
+              </a:defRPr>
+            </a:lvl4pPr>
+            <a:lvl5pPr>
+              <a:defRPr>
+                <a:latin typeface="Bahnschrift" panose="020B0502040204020203" pitchFamily="34" charset="0"/>
+              </a:defRPr>
+            </a:lvl5pPr>
+          </a:lstStyle>
           <a:p>
             <a:pPr lvl="0"/>
             <a:r>
@@ -1880,7 +1908,7 @@
           <p:cNvPr id="4" name="Date Placeholder 3">
             <a:extLst>
               <a:ext uri="{FF2B5EF4-FFF2-40B4-BE49-F238E27FC236}">
-                <a16:creationId xmlns:a16="http://schemas.microsoft.com/office/drawing/2014/main" id="{90B12041-A368-4396-A1E0-3E9A85C11775}"/>
+                <a16:creationId xmlns:a16="http://schemas.microsoft.com/office/drawing/2014/main" id="{5375B9E3-7991-426A-B617-91AD1053A98D}"/>
               </a:ext>
             </a:extLst>
           </p:cNvPr>
@@ -1894,11 +1922,18 @@
         <p:spPr/>
         <p:txBody>
           <a:bodyPr/>
-          <a:lstStyle/>
+          <a:lstStyle>
+            <a:lvl1pPr>
+              <a:defRPr>
+                <a:latin typeface="Bahnschrift" panose="020B0502040204020203" pitchFamily="34" charset="0"/>
+              </a:defRPr>
+            </a:lvl1pPr>
+          </a:lstStyle>
           <a:p>
             <a:fld id="{43CEAD56-E5CE-4A48-BE26-3F874B3EFFB2}" type="datetimeFigureOut">
               <a:rPr lang="en-US" smtClean="0"/>
-              <a:t>10/24/2018</a:t>
+              <a:pPr/>
+              <a:t>10/25/2018</a:t>
             </a:fld>
             <a:endParaRPr lang="en-US"/>
           </a:p>
@@ -1909,7 +1944,7 @@
           <p:cNvPr id="5" name="Footer Placeholder 4">
             <a:extLst>
               <a:ext uri="{FF2B5EF4-FFF2-40B4-BE49-F238E27FC236}">
-                <a16:creationId xmlns:a16="http://schemas.microsoft.com/office/drawing/2014/main" id="{A53D7D04-BBF4-4DD8-B294-BCA088A3DC17}"/>
+                <a16:creationId xmlns:a16="http://schemas.microsoft.com/office/drawing/2014/main" id="{59EA8710-9730-4DA2-834C-6FF7F80794E2}"/>
               </a:ext>
             </a:extLst>
           </p:cNvPr>
@@ -1923,7 +1958,13 @@
         <p:spPr/>
         <p:txBody>
           <a:bodyPr/>
-          <a:lstStyle/>
+          <a:lstStyle>
+            <a:lvl1pPr>
+              <a:defRPr>
+                <a:latin typeface="Bahnschrift" panose="020B0502040204020203" pitchFamily="34" charset="0"/>
+              </a:defRPr>
+            </a:lvl1pPr>
+          </a:lstStyle>
           <a:p>
             <a:endParaRPr lang="en-US"/>
           </a:p>
@@ -1934,7 +1975,7 @@
           <p:cNvPr id="6" name="Slide Number Placeholder 5">
             <a:extLst>
               <a:ext uri="{FF2B5EF4-FFF2-40B4-BE49-F238E27FC236}">
-                <a16:creationId xmlns:a16="http://schemas.microsoft.com/office/drawing/2014/main" id="{00F43743-13F2-424A-88FA-CA4A9EDEC803}"/>
+                <a16:creationId xmlns:a16="http://schemas.microsoft.com/office/drawing/2014/main" id="{2F0B1668-8539-4E7C-85F9-102009D4BDA6}"/>
               </a:ext>
             </a:extLst>
           </p:cNvPr>
@@ -1948,20 +1989,63 @@
         <p:spPr/>
         <p:txBody>
           <a:bodyPr/>
-          <a:lstStyle/>
+          <a:lstStyle>
+            <a:lvl1pPr>
+              <a:defRPr>
+                <a:latin typeface="Bahnschrift" panose="020B0502040204020203" pitchFamily="34" charset="0"/>
+              </a:defRPr>
+            </a:lvl1pPr>
+          </a:lstStyle>
           <a:p>
             <a:fld id="{4DC36BF6-A249-4B54-A7AC-5D17690532DB}" type="slidenum">
               <a:rPr lang="en-US" smtClean="0"/>
+              <a:pPr/>
               <a:t>‹#›</a:t>
             </a:fld>
             <a:endParaRPr lang="en-US"/>
           </a:p>
         </p:txBody>
       </p:sp>
+      <p:pic>
+        <p:nvPicPr>
+          <p:cNvPr id="10" name="Picture 9" descr="A close up of a sign&#10;&#10;Description generated with high confidence">
+            <a:extLst>
+              <a:ext uri="{FF2B5EF4-FFF2-40B4-BE49-F238E27FC236}">
+                <a16:creationId xmlns:a16="http://schemas.microsoft.com/office/drawing/2014/main" id="{F56C89C9-57C3-422E-ACD9-933F1BF4CE97}"/>
+              </a:ext>
+            </a:extLst>
+          </p:cNvPr>
+          <p:cNvPicPr>
+            <a:picLocks noChangeAspect="1"/>
+          </p:cNvPicPr>
+          <p:nvPr userDrawn="1"/>
+        </p:nvPicPr>
+        <p:blipFill>
+          <a:blip r:embed="rId2">
+            <a:extLst>
+              <a:ext uri="{28A0092B-C50C-407E-A947-70E740481C1C}">
+                <a14:useLocalDpi xmlns:a14="http://schemas.microsoft.com/office/drawing/2010/main" val="0"/>
+              </a:ext>
+            </a:extLst>
+          </a:blip>
+          <a:stretch>
+            <a:fillRect/>
+          </a:stretch>
+        </p:blipFill>
+        <p:spPr>
+          <a:xfrm>
+            <a:off x="10859056" y="550084"/>
+            <a:ext cx="989487" cy="955644"/>
+          </a:xfrm>
+          <a:prstGeom prst="rect">
+            <a:avLst/>
+          </a:prstGeom>
+        </p:spPr>
+      </p:pic>
     </p:spTree>
     <p:extLst>
       <p:ext uri="{BB962C8B-B14F-4D97-AF65-F5344CB8AC3E}">
-        <p14:creationId xmlns:p14="http://schemas.microsoft.com/office/powerpoint/2010/main" val="3936030935"/>
+        <p14:creationId xmlns:p14="http://schemas.microsoft.com/office/powerpoint/2010/main" val="1445320905"/>
       </p:ext>
     </p:extLst>
   </p:cSld>
@@ -1993,7 +2077,7 @@
           <p:cNvPr id="2" name="Title 1">
             <a:extLst>
               <a:ext uri="{FF2B5EF4-FFF2-40B4-BE49-F238E27FC236}">
-                <a16:creationId xmlns:a16="http://schemas.microsoft.com/office/drawing/2014/main" id="{5F9DC917-BCF9-4111-9DA7-17087B895777}"/>
+                <a16:creationId xmlns:a16="http://schemas.microsoft.com/office/drawing/2014/main" id="{0475E265-DA4F-40E6-9EEE-026624B0239A}"/>
               </a:ext>
             </a:extLst>
           </p:cNvPr>
@@ -2030,7 +2114,7 @@
           <p:cNvPr id="3" name="Text Placeholder 2">
             <a:extLst>
               <a:ext uri="{FF2B5EF4-FFF2-40B4-BE49-F238E27FC236}">
-                <a16:creationId xmlns:a16="http://schemas.microsoft.com/office/drawing/2014/main" id="{550C78B4-87BB-4206-B367-1480414F9D8B}"/>
+                <a16:creationId xmlns:a16="http://schemas.microsoft.com/office/drawing/2014/main" id="{44F81E34-19E9-4617-B42C-D0105C86D7E3}"/>
               </a:ext>
             </a:extLst>
           </p:cNvPr>
@@ -2155,7 +2239,7 @@
           <p:cNvPr id="4" name="Date Placeholder 3">
             <a:extLst>
               <a:ext uri="{FF2B5EF4-FFF2-40B4-BE49-F238E27FC236}">
-                <a16:creationId xmlns:a16="http://schemas.microsoft.com/office/drawing/2014/main" id="{3410CF73-041D-4836-96A0-3B7A8592B614}"/>
+                <a16:creationId xmlns:a16="http://schemas.microsoft.com/office/drawing/2014/main" id="{13F88E5C-3D51-445A-AD9F-9957DF6ACAAC}"/>
               </a:ext>
             </a:extLst>
           </p:cNvPr>
@@ -2173,7 +2257,7 @@
           <a:p>
             <a:fld id="{43CEAD56-E5CE-4A48-BE26-3F874B3EFFB2}" type="datetimeFigureOut">
               <a:rPr lang="en-US" smtClean="0"/>
-              <a:t>10/24/2018</a:t>
+              <a:t>10/25/2018</a:t>
             </a:fld>
             <a:endParaRPr lang="en-US"/>
           </a:p>
@@ -2184,7 +2268,7 @@
           <p:cNvPr id="5" name="Footer Placeholder 4">
             <a:extLst>
               <a:ext uri="{FF2B5EF4-FFF2-40B4-BE49-F238E27FC236}">
-                <a16:creationId xmlns:a16="http://schemas.microsoft.com/office/drawing/2014/main" id="{30BE432E-3E01-4725-A9E9-EBB86F71C6DA}"/>
+                <a16:creationId xmlns:a16="http://schemas.microsoft.com/office/drawing/2014/main" id="{4C1468B0-9ADB-4CF9-A1F7-D9D9A735CCA3}"/>
               </a:ext>
             </a:extLst>
           </p:cNvPr>
@@ -2209,7 +2293,7 @@
           <p:cNvPr id="6" name="Slide Number Placeholder 5">
             <a:extLst>
               <a:ext uri="{FF2B5EF4-FFF2-40B4-BE49-F238E27FC236}">
-                <a16:creationId xmlns:a16="http://schemas.microsoft.com/office/drawing/2014/main" id="{9050BEF3-5810-43C6-B364-60970834EEE3}"/>
+                <a16:creationId xmlns:a16="http://schemas.microsoft.com/office/drawing/2014/main" id="{8A7AADE1-66B5-4040-A491-EA936CD73012}"/>
               </a:ext>
             </a:extLst>
           </p:cNvPr>
@@ -2236,7 +2320,7 @@
     </p:spTree>
     <p:extLst>
       <p:ext uri="{BB962C8B-B14F-4D97-AF65-F5344CB8AC3E}">
-        <p14:creationId xmlns:p14="http://schemas.microsoft.com/office/powerpoint/2010/main" val="1848040265"/>
+        <p14:creationId xmlns:p14="http://schemas.microsoft.com/office/powerpoint/2010/main" val="134439041"/>
       </p:ext>
     </p:extLst>
   </p:cSld>
@@ -2268,7 +2352,7 @@
           <p:cNvPr id="2" name="Title 1">
             <a:extLst>
               <a:ext uri="{FF2B5EF4-FFF2-40B4-BE49-F238E27FC236}">
-                <a16:creationId xmlns:a16="http://schemas.microsoft.com/office/drawing/2014/main" id="{BD370E30-BC99-419F-B20B-99A8B924F27A}"/>
+                <a16:creationId xmlns:a16="http://schemas.microsoft.com/office/drawing/2014/main" id="{6A6BBB2B-2AE4-4C3C-BCCB-64EF58B5560F}"/>
               </a:ext>
             </a:extLst>
           </p:cNvPr>
@@ -2296,7 +2380,7 @@
           <p:cNvPr id="3" name="Content Placeholder 2">
             <a:extLst>
               <a:ext uri="{FF2B5EF4-FFF2-40B4-BE49-F238E27FC236}">
-                <a16:creationId xmlns:a16="http://schemas.microsoft.com/office/drawing/2014/main" id="{F7A86DD6-75F6-4720-BD69-9EA8AFDCD5BC}"/>
+                <a16:creationId xmlns:a16="http://schemas.microsoft.com/office/drawing/2014/main" id="{9CA44EF8-7617-4C9B-B8CE-1FFE0998E5BA}"/>
               </a:ext>
             </a:extLst>
           </p:cNvPr>
@@ -2358,7 +2442,7 @@
           <p:cNvPr id="4" name="Content Placeholder 3">
             <a:extLst>
               <a:ext uri="{FF2B5EF4-FFF2-40B4-BE49-F238E27FC236}">
-                <a16:creationId xmlns:a16="http://schemas.microsoft.com/office/drawing/2014/main" id="{2E1F27B6-5A13-4339-9827-242CD2C093C2}"/>
+                <a16:creationId xmlns:a16="http://schemas.microsoft.com/office/drawing/2014/main" id="{77C27334-0329-4E87-8846-E729CD66A243}"/>
               </a:ext>
             </a:extLst>
           </p:cNvPr>
@@ -2420,7 +2504,7 @@
           <p:cNvPr id="5" name="Date Placeholder 4">
             <a:extLst>
               <a:ext uri="{FF2B5EF4-FFF2-40B4-BE49-F238E27FC236}">
-                <a16:creationId xmlns:a16="http://schemas.microsoft.com/office/drawing/2014/main" id="{0500A199-0BFD-435B-8853-E251FA964C0D}"/>
+                <a16:creationId xmlns:a16="http://schemas.microsoft.com/office/drawing/2014/main" id="{47739559-D3DB-4DF5-9828-35813139F28F}"/>
               </a:ext>
             </a:extLst>
           </p:cNvPr>
@@ -2438,7 +2522,7 @@
           <a:p>
             <a:fld id="{43CEAD56-E5CE-4A48-BE26-3F874B3EFFB2}" type="datetimeFigureOut">
               <a:rPr lang="en-US" smtClean="0"/>
-              <a:t>10/24/2018</a:t>
+              <a:t>10/25/2018</a:t>
             </a:fld>
             <a:endParaRPr lang="en-US"/>
           </a:p>
@@ -2449,7 +2533,7 @@
           <p:cNvPr id="6" name="Footer Placeholder 5">
             <a:extLst>
               <a:ext uri="{FF2B5EF4-FFF2-40B4-BE49-F238E27FC236}">
-                <a16:creationId xmlns:a16="http://schemas.microsoft.com/office/drawing/2014/main" id="{2EDAF3BD-F030-4963-9B4D-DE0284FA9DBA}"/>
+                <a16:creationId xmlns:a16="http://schemas.microsoft.com/office/drawing/2014/main" id="{7C1B35CC-EAB4-4B00-BD12-A45514C7F53D}"/>
               </a:ext>
             </a:extLst>
           </p:cNvPr>
@@ -2474,7 +2558,7 @@
           <p:cNvPr id="7" name="Slide Number Placeholder 6">
             <a:extLst>
               <a:ext uri="{FF2B5EF4-FFF2-40B4-BE49-F238E27FC236}">
-                <a16:creationId xmlns:a16="http://schemas.microsoft.com/office/drawing/2014/main" id="{2F28FC9B-24E8-476B-8EA9-278A81CC814C}"/>
+                <a16:creationId xmlns:a16="http://schemas.microsoft.com/office/drawing/2014/main" id="{F138E135-CA40-4987-B16F-F82A7B224351}"/>
               </a:ext>
             </a:extLst>
           </p:cNvPr>
@@ -2501,7 +2585,7 @@
     </p:spTree>
     <p:extLst>
       <p:ext uri="{BB962C8B-B14F-4D97-AF65-F5344CB8AC3E}">
-        <p14:creationId xmlns:p14="http://schemas.microsoft.com/office/powerpoint/2010/main" val="1635436613"/>
+        <p14:creationId xmlns:p14="http://schemas.microsoft.com/office/powerpoint/2010/main" val="3750254291"/>
       </p:ext>
     </p:extLst>
   </p:cSld>
@@ -2533,7 +2617,7 @@
           <p:cNvPr id="2" name="Title 1">
             <a:extLst>
               <a:ext uri="{FF2B5EF4-FFF2-40B4-BE49-F238E27FC236}">
-                <a16:creationId xmlns:a16="http://schemas.microsoft.com/office/drawing/2014/main" id="{0F71E4E3-5A5C-4D0C-89B5-1A779F52B94B}"/>
+                <a16:creationId xmlns:a16="http://schemas.microsoft.com/office/drawing/2014/main" id="{CDF1FE84-5043-4FB3-90D1-A68220C9CC7C}"/>
               </a:ext>
             </a:extLst>
           </p:cNvPr>
@@ -2566,7 +2650,7 @@
           <p:cNvPr id="3" name="Text Placeholder 2">
             <a:extLst>
               <a:ext uri="{FF2B5EF4-FFF2-40B4-BE49-F238E27FC236}">
-                <a16:creationId xmlns:a16="http://schemas.microsoft.com/office/drawing/2014/main" id="{8BEC8857-DA8C-4344-9865-DDC8F7D02391}"/>
+                <a16:creationId xmlns:a16="http://schemas.microsoft.com/office/drawing/2014/main" id="{6A415D7D-57C6-42AF-8DAA-28AC9665BA08}"/>
               </a:ext>
             </a:extLst>
           </p:cNvPr>
@@ -2637,7 +2721,7 @@
           <p:cNvPr id="4" name="Content Placeholder 3">
             <a:extLst>
               <a:ext uri="{FF2B5EF4-FFF2-40B4-BE49-F238E27FC236}">
-                <a16:creationId xmlns:a16="http://schemas.microsoft.com/office/drawing/2014/main" id="{9114E18C-7619-4081-9417-0AFA00BB6CD6}"/>
+                <a16:creationId xmlns:a16="http://schemas.microsoft.com/office/drawing/2014/main" id="{05DA166A-BB30-439B-8634-7F0CEC2FEC07}"/>
               </a:ext>
             </a:extLst>
           </p:cNvPr>
@@ -2699,7 +2783,7 @@
           <p:cNvPr id="5" name="Text Placeholder 4">
             <a:extLst>
               <a:ext uri="{FF2B5EF4-FFF2-40B4-BE49-F238E27FC236}">
-                <a16:creationId xmlns:a16="http://schemas.microsoft.com/office/drawing/2014/main" id="{A18B93C0-2C63-4717-AC82-D4D6525949D0}"/>
+                <a16:creationId xmlns:a16="http://schemas.microsoft.com/office/drawing/2014/main" id="{DE8E7921-A9C5-4535-97D9-BC847906E7E0}"/>
               </a:ext>
             </a:extLst>
           </p:cNvPr>
@@ -2770,7 +2854,7 @@
           <p:cNvPr id="6" name="Content Placeholder 5">
             <a:extLst>
               <a:ext uri="{FF2B5EF4-FFF2-40B4-BE49-F238E27FC236}">
-                <a16:creationId xmlns:a16="http://schemas.microsoft.com/office/drawing/2014/main" id="{FF965ECB-4E31-466C-8D0F-E4F2B005C606}"/>
+                <a16:creationId xmlns:a16="http://schemas.microsoft.com/office/drawing/2014/main" id="{88DDA552-E26C-4625-B5CB-F502D9FB5A26}"/>
               </a:ext>
             </a:extLst>
           </p:cNvPr>
@@ -2832,7 +2916,7 @@
           <p:cNvPr id="7" name="Date Placeholder 6">
             <a:extLst>
               <a:ext uri="{FF2B5EF4-FFF2-40B4-BE49-F238E27FC236}">
-                <a16:creationId xmlns:a16="http://schemas.microsoft.com/office/drawing/2014/main" id="{FA76C466-3255-47D0-9E37-DFDA49345D6A}"/>
+                <a16:creationId xmlns:a16="http://schemas.microsoft.com/office/drawing/2014/main" id="{17F4FEF0-02F9-4D88-9494-4F3109B6BCDB}"/>
               </a:ext>
             </a:extLst>
           </p:cNvPr>
@@ -2850,7 +2934,7 @@
           <a:p>
             <a:fld id="{43CEAD56-E5CE-4A48-BE26-3F874B3EFFB2}" type="datetimeFigureOut">
               <a:rPr lang="en-US" smtClean="0"/>
-              <a:t>10/24/2018</a:t>
+              <a:t>10/25/2018</a:t>
             </a:fld>
             <a:endParaRPr lang="en-US"/>
           </a:p>
@@ -2861,7 +2945,7 @@
           <p:cNvPr id="8" name="Footer Placeholder 7">
             <a:extLst>
               <a:ext uri="{FF2B5EF4-FFF2-40B4-BE49-F238E27FC236}">
-                <a16:creationId xmlns:a16="http://schemas.microsoft.com/office/drawing/2014/main" id="{60F40B7F-38F7-4E26-BCA6-60830A5AEF75}"/>
+                <a16:creationId xmlns:a16="http://schemas.microsoft.com/office/drawing/2014/main" id="{D6C8F848-4294-44C2-871F-256B4E495AFF}"/>
               </a:ext>
             </a:extLst>
           </p:cNvPr>
@@ -2886,7 +2970,7 @@
           <p:cNvPr id="9" name="Slide Number Placeholder 8">
             <a:extLst>
               <a:ext uri="{FF2B5EF4-FFF2-40B4-BE49-F238E27FC236}">
-                <a16:creationId xmlns:a16="http://schemas.microsoft.com/office/drawing/2014/main" id="{F25BF69D-9308-4455-9EEF-AE51A9B48114}"/>
+                <a16:creationId xmlns:a16="http://schemas.microsoft.com/office/drawing/2014/main" id="{811DF4AE-E05C-4C58-BCB4-8E48B2BC3424}"/>
               </a:ext>
             </a:extLst>
           </p:cNvPr>
@@ -2913,7 +2997,7 @@
     </p:spTree>
     <p:extLst>
       <p:ext uri="{BB962C8B-B14F-4D97-AF65-F5344CB8AC3E}">
-        <p14:creationId xmlns:p14="http://schemas.microsoft.com/office/powerpoint/2010/main" val="626933865"/>
+        <p14:creationId xmlns:p14="http://schemas.microsoft.com/office/powerpoint/2010/main" val="2251006651"/>
       </p:ext>
     </p:extLst>
   </p:cSld>
@@ -2945,7 +3029,7 @@
           <p:cNvPr id="2" name="Title 1">
             <a:extLst>
               <a:ext uri="{FF2B5EF4-FFF2-40B4-BE49-F238E27FC236}">
-                <a16:creationId xmlns:a16="http://schemas.microsoft.com/office/drawing/2014/main" id="{DFD5095D-EC49-460F-928D-67384BF1C5A4}"/>
+                <a16:creationId xmlns:a16="http://schemas.microsoft.com/office/drawing/2014/main" id="{D9EF4ADA-7D87-4F08-AC95-6ECB0D4454F5}"/>
               </a:ext>
             </a:extLst>
           </p:cNvPr>
@@ -2973,7 +3057,7 @@
           <p:cNvPr id="3" name="Date Placeholder 2">
             <a:extLst>
               <a:ext uri="{FF2B5EF4-FFF2-40B4-BE49-F238E27FC236}">
-                <a16:creationId xmlns:a16="http://schemas.microsoft.com/office/drawing/2014/main" id="{7AE5C1A1-7DF8-43A4-AB39-1801ACE8B5A5}"/>
+                <a16:creationId xmlns:a16="http://schemas.microsoft.com/office/drawing/2014/main" id="{468B6DBB-F685-4ECF-8432-7066E27C68F8}"/>
               </a:ext>
             </a:extLst>
           </p:cNvPr>
@@ -2991,7 +3075,7 @@
           <a:p>
             <a:fld id="{43CEAD56-E5CE-4A48-BE26-3F874B3EFFB2}" type="datetimeFigureOut">
               <a:rPr lang="en-US" smtClean="0"/>
-              <a:t>10/24/2018</a:t>
+              <a:t>10/25/2018</a:t>
             </a:fld>
             <a:endParaRPr lang="en-US"/>
           </a:p>
@@ -3002,7 +3086,7 @@
           <p:cNvPr id="4" name="Footer Placeholder 3">
             <a:extLst>
               <a:ext uri="{FF2B5EF4-FFF2-40B4-BE49-F238E27FC236}">
-                <a16:creationId xmlns:a16="http://schemas.microsoft.com/office/drawing/2014/main" id="{5987A75C-E0D2-43AF-ADEC-2C1E0C2D5CCE}"/>
+                <a16:creationId xmlns:a16="http://schemas.microsoft.com/office/drawing/2014/main" id="{821B579E-E71F-4B93-83F3-79DB15CE22E0}"/>
               </a:ext>
             </a:extLst>
           </p:cNvPr>
@@ -3027,7 +3111,7 @@
           <p:cNvPr id="5" name="Slide Number Placeholder 4">
             <a:extLst>
               <a:ext uri="{FF2B5EF4-FFF2-40B4-BE49-F238E27FC236}">
-                <a16:creationId xmlns:a16="http://schemas.microsoft.com/office/drawing/2014/main" id="{9553D0AD-E56E-4CE8-908D-DE0E2CF849C0}"/>
+                <a16:creationId xmlns:a16="http://schemas.microsoft.com/office/drawing/2014/main" id="{5F73CC85-E405-43F1-A45F-088AD399149C}"/>
               </a:ext>
             </a:extLst>
           </p:cNvPr>
@@ -3054,7 +3138,7 @@
     </p:spTree>
     <p:extLst>
       <p:ext uri="{BB962C8B-B14F-4D97-AF65-F5344CB8AC3E}">
-        <p14:creationId xmlns:p14="http://schemas.microsoft.com/office/powerpoint/2010/main" val="2883067251"/>
+        <p14:creationId xmlns:p14="http://schemas.microsoft.com/office/powerpoint/2010/main" val="2751137425"/>
       </p:ext>
     </p:extLst>
   </p:cSld>
@@ -3086,7 +3170,7 @@
           <p:cNvPr id="2" name="Date Placeholder 1">
             <a:extLst>
               <a:ext uri="{FF2B5EF4-FFF2-40B4-BE49-F238E27FC236}">
-                <a16:creationId xmlns:a16="http://schemas.microsoft.com/office/drawing/2014/main" id="{CA028CA5-13F0-4611-AE48-040330822A22}"/>
+                <a16:creationId xmlns:a16="http://schemas.microsoft.com/office/drawing/2014/main" id="{BD8F2744-9A09-4A3A-81CB-C2355FF88B21}"/>
               </a:ext>
             </a:extLst>
           </p:cNvPr>
@@ -3104,7 +3188,7 @@
           <a:p>
             <a:fld id="{43CEAD56-E5CE-4A48-BE26-3F874B3EFFB2}" type="datetimeFigureOut">
               <a:rPr lang="en-US" smtClean="0"/>
-              <a:t>10/24/2018</a:t>
+              <a:t>10/25/2018</a:t>
             </a:fld>
             <a:endParaRPr lang="en-US"/>
           </a:p>
@@ -3115,7 +3199,7 @@
           <p:cNvPr id="3" name="Footer Placeholder 2">
             <a:extLst>
               <a:ext uri="{FF2B5EF4-FFF2-40B4-BE49-F238E27FC236}">
-                <a16:creationId xmlns:a16="http://schemas.microsoft.com/office/drawing/2014/main" id="{1D10BC7B-9807-4005-8219-3A8D732A0C0B}"/>
+                <a16:creationId xmlns:a16="http://schemas.microsoft.com/office/drawing/2014/main" id="{E93BD100-7C63-48C4-B9EC-15E3B668FDCB}"/>
               </a:ext>
             </a:extLst>
           </p:cNvPr>
@@ -3140,7 +3224,7 @@
           <p:cNvPr id="4" name="Slide Number Placeholder 3">
             <a:extLst>
               <a:ext uri="{FF2B5EF4-FFF2-40B4-BE49-F238E27FC236}">
-                <a16:creationId xmlns:a16="http://schemas.microsoft.com/office/drawing/2014/main" id="{E4C4EE15-5B44-48E9-BE4D-57B5FCE0F256}"/>
+                <a16:creationId xmlns:a16="http://schemas.microsoft.com/office/drawing/2014/main" id="{7BCBAAA7-9A70-431A-AF0D-91635362EA60}"/>
               </a:ext>
             </a:extLst>
           </p:cNvPr>
@@ -3167,7 +3251,7 @@
     </p:spTree>
     <p:extLst>
       <p:ext uri="{BB962C8B-B14F-4D97-AF65-F5344CB8AC3E}">
-        <p14:creationId xmlns:p14="http://schemas.microsoft.com/office/powerpoint/2010/main" val="1439787638"/>
+        <p14:creationId xmlns:p14="http://schemas.microsoft.com/office/powerpoint/2010/main" val="3034056471"/>
       </p:ext>
     </p:extLst>
   </p:cSld>
@@ -3199,7 +3283,7 @@
           <p:cNvPr id="2" name="Title 1">
             <a:extLst>
               <a:ext uri="{FF2B5EF4-FFF2-40B4-BE49-F238E27FC236}">
-                <a16:creationId xmlns:a16="http://schemas.microsoft.com/office/drawing/2014/main" id="{B5D3FB5F-2D46-40BD-B1EC-69896A53E1C9}"/>
+                <a16:creationId xmlns:a16="http://schemas.microsoft.com/office/drawing/2014/main" id="{43B98785-FF9C-40EE-96C5-4156E76FECDE}"/>
               </a:ext>
             </a:extLst>
           </p:cNvPr>
@@ -3236,7 +3320,7 @@
           <p:cNvPr id="3" name="Content Placeholder 2">
             <a:extLst>
               <a:ext uri="{FF2B5EF4-FFF2-40B4-BE49-F238E27FC236}">
-                <a16:creationId xmlns:a16="http://schemas.microsoft.com/office/drawing/2014/main" id="{413F67DE-F302-4D0C-8BB6-0363A0F226B8}"/>
+                <a16:creationId xmlns:a16="http://schemas.microsoft.com/office/drawing/2014/main" id="{094331A7-B85A-437F-B546-E951C8612C14}"/>
               </a:ext>
             </a:extLst>
           </p:cNvPr>
@@ -3326,7 +3410,7 @@
           <p:cNvPr id="4" name="Text Placeholder 3">
             <a:extLst>
               <a:ext uri="{FF2B5EF4-FFF2-40B4-BE49-F238E27FC236}">
-                <a16:creationId xmlns:a16="http://schemas.microsoft.com/office/drawing/2014/main" id="{D62894C8-99A6-4CC6-BA5C-164BC7FE1EC0}"/>
+                <a16:creationId xmlns:a16="http://schemas.microsoft.com/office/drawing/2014/main" id="{AF034E88-6139-40D2-AE10-7757907A3716}"/>
               </a:ext>
             </a:extLst>
           </p:cNvPr>
@@ -3397,7 +3481,7 @@
           <p:cNvPr id="5" name="Date Placeholder 4">
             <a:extLst>
               <a:ext uri="{FF2B5EF4-FFF2-40B4-BE49-F238E27FC236}">
-                <a16:creationId xmlns:a16="http://schemas.microsoft.com/office/drawing/2014/main" id="{D51FC759-AC48-4F8E-9E54-153DAFCE05AC}"/>
+                <a16:creationId xmlns:a16="http://schemas.microsoft.com/office/drawing/2014/main" id="{C75B43E8-9518-46F1-9326-18E8DA3EB411}"/>
               </a:ext>
             </a:extLst>
           </p:cNvPr>
@@ -3415,7 +3499,7 @@
           <a:p>
             <a:fld id="{43CEAD56-E5CE-4A48-BE26-3F874B3EFFB2}" type="datetimeFigureOut">
               <a:rPr lang="en-US" smtClean="0"/>
-              <a:t>10/24/2018</a:t>
+              <a:t>10/25/2018</a:t>
             </a:fld>
             <a:endParaRPr lang="en-US"/>
           </a:p>
@@ -3426,7 +3510,7 @@
           <p:cNvPr id="6" name="Footer Placeholder 5">
             <a:extLst>
               <a:ext uri="{FF2B5EF4-FFF2-40B4-BE49-F238E27FC236}">
-                <a16:creationId xmlns:a16="http://schemas.microsoft.com/office/drawing/2014/main" id="{56235A42-5080-41B0-96E2-918F0499E7FC}"/>
+                <a16:creationId xmlns:a16="http://schemas.microsoft.com/office/drawing/2014/main" id="{50FD5361-30DF-4949-8508-01B18AE495C5}"/>
               </a:ext>
             </a:extLst>
           </p:cNvPr>
@@ -3451,7 +3535,7 @@
           <p:cNvPr id="7" name="Slide Number Placeholder 6">
             <a:extLst>
               <a:ext uri="{FF2B5EF4-FFF2-40B4-BE49-F238E27FC236}">
-                <a16:creationId xmlns:a16="http://schemas.microsoft.com/office/drawing/2014/main" id="{0132E0C8-66A7-4FD5-8F64-E46FBB08E965}"/>
+                <a16:creationId xmlns:a16="http://schemas.microsoft.com/office/drawing/2014/main" id="{2CF2A971-4769-45F0-A0D3-C194BD253DC2}"/>
               </a:ext>
             </a:extLst>
           </p:cNvPr>
@@ -3478,7 +3562,7 @@
     </p:spTree>
     <p:extLst>
       <p:ext uri="{BB962C8B-B14F-4D97-AF65-F5344CB8AC3E}">
-        <p14:creationId xmlns:p14="http://schemas.microsoft.com/office/powerpoint/2010/main" val="3162862313"/>
+        <p14:creationId xmlns:p14="http://schemas.microsoft.com/office/powerpoint/2010/main" val="624882859"/>
       </p:ext>
     </p:extLst>
   </p:cSld>
@@ -3510,7 +3594,7 @@
           <p:cNvPr id="2" name="Title 1">
             <a:extLst>
               <a:ext uri="{FF2B5EF4-FFF2-40B4-BE49-F238E27FC236}">
-                <a16:creationId xmlns:a16="http://schemas.microsoft.com/office/drawing/2014/main" id="{FBDF9722-6B31-4F43-8844-6FA5D71D0EC8}"/>
+                <a16:creationId xmlns:a16="http://schemas.microsoft.com/office/drawing/2014/main" id="{1DCB8260-8A27-4A3B-AADC-0D418F9E7BD8}"/>
               </a:ext>
             </a:extLst>
           </p:cNvPr>
@@ -3547,7 +3631,7 @@
           <p:cNvPr id="3" name="Picture Placeholder 2">
             <a:extLst>
               <a:ext uri="{FF2B5EF4-FFF2-40B4-BE49-F238E27FC236}">
-                <a16:creationId xmlns:a16="http://schemas.microsoft.com/office/drawing/2014/main" id="{E1A3055F-F681-4828-A3E0-2B6E173CF4AA}"/>
+                <a16:creationId xmlns:a16="http://schemas.microsoft.com/office/drawing/2014/main" id="{0A9CAAA9-4A28-480F-89AB-CC5B92121659}"/>
               </a:ext>
             </a:extLst>
           </p:cNvPr>
@@ -3614,7 +3698,7 @@
           <p:cNvPr id="4" name="Text Placeholder 3">
             <a:extLst>
               <a:ext uri="{FF2B5EF4-FFF2-40B4-BE49-F238E27FC236}">
-                <a16:creationId xmlns:a16="http://schemas.microsoft.com/office/drawing/2014/main" id="{B7B159A9-C15B-4B14-B4CC-AD5E17D9CFA7}"/>
+                <a16:creationId xmlns:a16="http://schemas.microsoft.com/office/drawing/2014/main" id="{E0C3FCFF-8324-4EFE-93F0-7698288B14F6}"/>
               </a:ext>
             </a:extLst>
           </p:cNvPr>
@@ -3685,7 +3769,7 @@
           <p:cNvPr id="5" name="Date Placeholder 4">
             <a:extLst>
               <a:ext uri="{FF2B5EF4-FFF2-40B4-BE49-F238E27FC236}">
-                <a16:creationId xmlns:a16="http://schemas.microsoft.com/office/drawing/2014/main" id="{18DB940C-254C-4068-AA22-E999FF6AF331}"/>
+                <a16:creationId xmlns:a16="http://schemas.microsoft.com/office/drawing/2014/main" id="{5D146B3F-4EB5-474C-966A-E217E0B01CFF}"/>
               </a:ext>
             </a:extLst>
           </p:cNvPr>
@@ -3703,7 +3787,7 @@
           <a:p>
             <a:fld id="{43CEAD56-E5CE-4A48-BE26-3F874B3EFFB2}" type="datetimeFigureOut">
               <a:rPr lang="en-US" smtClean="0"/>
-              <a:t>10/24/2018</a:t>
+              <a:t>10/25/2018</a:t>
             </a:fld>
             <a:endParaRPr lang="en-US"/>
           </a:p>
@@ -3714,7 +3798,7 @@
           <p:cNvPr id="6" name="Footer Placeholder 5">
             <a:extLst>
               <a:ext uri="{FF2B5EF4-FFF2-40B4-BE49-F238E27FC236}">
-                <a16:creationId xmlns:a16="http://schemas.microsoft.com/office/drawing/2014/main" id="{E1785F6C-141E-460A-ABBA-E1F88757D9AD}"/>
+                <a16:creationId xmlns:a16="http://schemas.microsoft.com/office/drawing/2014/main" id="{9612E246-210E-4874-9A38-5A68CDAE9BB4}"/>
               </a:ext>
             </a:extLst>
           </p:cNvPr>
@@ -3739,7 +3823,7 @@
           <p:cNvPr id="7" name="Slide Number Placeholder 6">
             <a:extLst>
               <a:ext uri="{FF2B5EF4-FFF2-40B4-BE49-F238E27FC236}">
-                <a16:creationId xmlns:a16="http://schemas.microsoft.com/office/drawing/2014/main" id="{AF40B232-DA99-40A3-9E4B-EC9A313CBC58}"/>
+                <a16:creationId xmlns:a16="http://schemas.microsoft.com/office/drawing/2014/main" id="{DF1020F8-919F-4DBE-8348-1A327A4BC801}"/>
               </a:ext>
             </a:extLst>
           </p:cNvPr>
@@ -3766,7 +3850,7 @@
     </p:spTree>
     <p:extLst>
       <p:ext uri="{BB962C8B-B14F-4D97-AF65-F5344CB8AC3E}">
-        <p14:creationId xmlns:p14="http://schemas.microsoft.com/office/powerpoint/2010/main" val="1964011052"/>
+        <p14:creationId xmlns:p14="http://schemas.microsoft.com/office/powerpoint/2010/main" val="1634133715"/>
       </p:ext>
     </p:extLst>
   </p:cSld>
@@ -3803,7 +3887,7 @@
           <p:cNvPr id="2" name="Title Placeholder 1">
             <a:extLst>
               <a:ext uri="{FF2B5EF4-FFF2-40B4-BE49-F238E27FC236}">
-                <a16:creationId xmlns:a16="http://schemas.microsoft.com/office/drawing/2014/main" id="{22E93C2A-753E-456C-8C84-B5984DF5B446}"/>
+                <a16:creationId xmlns:a16="http://schemas.microsoft.com/office/drawing/2014/main" id="{77BE0C88-9068-4B00-BF05-3EA4EEB36348}"/>
               </a:ext>
             </a:extLst>
           </p:cNvPr>
@@ -3841,7 +3925,7 @@
           <p:cNvPr id="3" name="Text Placeholder 2">
             <a:extLst>
               <a:ext uri="{FF2B5EF4-FFF2-40B4-BE49-F238E27FC236}">
-                <a16:creationId xmlns:a16="http://schemas.microsoft.com/office/drawing/2014/main" id="{ED02B75F-78B7-4083-9BDE-BDCF2E9C6110}"/>
+                <a16:creationId xmlns:a16="http://schemas.microsoft.com/office/drawing/2014/main" id="{682C6975-5406-453F-A3DF-7169DE295019}"/>
               </a:ext>
             </a:extLst>
           </p:cNvPr>
@@ -3908,7 +3992,7 @@
           <p:cNvPr id="4" name="Date Placeholder 3">
             <a:extLst>
               <a:ext uri="{FF2B5EF4-FFF2-40B4-BE49-F238E27FC236}">
-                <a16:creationId xmlns:a16="http://schemas.microsoft.com/office/drawing/2014/main" id="{14EDD2ED-1E44-4EB4-87EA-E417381BC572}"/>
+                <a16:creationId xmlns:a16="http://schemas.microsoft.com/office/drawing/2014/main" id="{603658DA-7F2A-4184-9536-1CCD65D1E3B7}"/>
               </a:ext>
             </a:extLst>
           </p:cNvPr>
@@ -3944,7 +4028,7 @@
           <a:p>
             <a:fld id="{43CEAD56-E5CE-4A48-BE26-3F874B3EFFB2}" type="datetimeFigureOut">
               <a:rPr lang="en-US" smtClean="0"/>
-              <a:t>10/24/2018</a:t>
+              <a:t>10/25/2018</a:t>
             </a:fld>
             <a:endParaRPr lang="en-US"/>
           </a:p>
@@ -3955,7 +4039,7 @@
           <p:cNvPr id="5" name="Footer Placeholder 4">
             <a:extLst>
               <a:ext uri="{FF2B5EF4-FFF2-40B4-BE49-F238E27FC236}">
-                <a16:creationId xmlns:a16="http://schemas.microsoft.com/office/drawing/2014/main" id="{375FF47C-3C8A-4991-9246-88D3F1A9F793}"/>
+                <a16:creationId xmlns:a16="http://schemas.microsoft.com/office/drawing/2014/main" id="{A5B6B6C9-3028-4ADF-81FA-CB1511723C17}"/>
               </a:ext>
             </a:extLst>
           </p:cNvPr>
@@ -3998,7 +4082,7 @@
           <p:cNvPr id="6" name="Slide Number Placeholder 5">
             <a:extLst>
               <a:ext uri="{FF2B5EF4-FFF2-40B4-BE49-F238E27FC236}">
-                <a16:creationId xmlns:a16="http://schemas.microsoft.com/office/drawing/2014/main" id="{88FC58EC-EB4F-4827-BEC5-0EBF23E2BF1C}"/>
+                <a16:creationId xmlns:a16="http://schemas.microsoft.com/office/drawing/2014/main" id="{C1317902-2357-4FCC-B113-F8E32ABDC757}"/>
               </a:ext>
             </a:extLst>
           </p:cNvPr>
@@ -4043,23 +4127,23 @@
     </p:spTree>
     <p:extLst>
       <p:ext uri="{BB962C8B-B14F-4D97-AF65-F5344CB8AC3E}">
-        <p14:creationId xmlns:p14="http://schemas.microsoft.com/office/powerpoint/2010/main" val="3342743368"/>
+        <p14:creationId xmlns:p14="http://schemas.microsoft.com/office/powerpoint/2010/main" val="673523143"/>
       </p:ext>
     </p:extLst>
   </p:cSld>
   <p:clrMap bg1="lt1" tx1="dk1" bg2="lt2" tx2="dk2" accent1="accent1" accent2="accent2" accent3="accent3" accent4="accent4" accent5="accent5" accent6="accent6" hlink="hlink" folHlink="folHlink"/>
   <p:sldLayoutIdLst>
-    <p:sldLayoutId id="2147483673" r:id="rId1"/>
-    <p:sldLayoutId id="2147483674" r:id="rId2"/>
-    <p:sldLayoutId id="2147483675" r:id="rId3"/>
-    <p:sldLayoutId id="2147483676" r:id="rId4"/>
-    <p:sldLayoutId id="2147483677" r:id="rId5"/>
-    <p:sldLayoutId id="2147483678" r:id="rId6"/>
-    <p:sldLayoutId id="2147483679" r:id="rId7"/>
-    <p:sldLayoutId id="2147483680" r:id="rId8"/>
-    <p:sldLayoutId id="2147483681" r:id="rId9"/>
-    <p:sldLayoutId id="2147483682" r:id="rId10"/>
-    <p:sldLayoutId id="2147483683" r:id="rId11"/>
+    <p:sldLayoutId id="2147483697" r:id="rId1"/>
+    <p:sldLayoutId id="2147483698" r:id="rId2"/>
+    <p:sldLayoutId id="2147483699" r:id="rId3"/>
+    <p:sldLayoutId id="2147483700" r:id="rId4"/>
+    <p:sldLayoutId id="2147483701" r:id="rId5"/>
+    <p:sldLayoutId id="2147483702" r:id="rId6"/>
+    <p:sldLayoutId id="2147483703" r:id="rId7"/>
+    <p:sldLayoutId id="2147483704" r:id="rId8"/>
+    <p:sldLayoutId id="2147483705" r:id="rId9"/>
+    <p:sldLayoutId id="2147483706" r:id="rId10"/>
+    <p:sldLayoutId id="2147483707" r:id="rId11"/>
   </p:sldLayoutIdLst>
   <p:txStyles>
     <p:titleStyle>
@@ -4452,6 +4536,401 @@
           <p:cNvPr id="2" name="Title 1">
             <a:extLst>
               <a:ext uri="{FF2B5EF4-FFF2-40B4-BE49-F238E27FC236}">
+                <a16:creationId xmlns:a16="http://schemas.microsoft.com/office/drawing/2014/main" id="{686C4237-8385-439A-86D4-DF3515A0EB4D}"/>
+              </a:ext>
+            </a:extLst>
+          </p:cNvPr>
+          <p:cNvSpPr>
+            <a:spLocks noGrp="1"/>
+          </p:cNvSpPr>
+          <p:nvPr>
+            <p:ph type="title"/>
+          </p:nvPr>
+        </p:nvSpPr>
+        <p:spPr>
+          <a:xfrm>
+            <a:off x="838200" y="365125"/>
+            <a:ext cx="10515600" cy="1325563"/>
+          </a:xfrm>
+        </p:spPr>
+        <p:txBody>
+          <a:bodyPr/>
+          <a:lstStyle/>
+          <a:p>
+            <a:r>
+              <a:rPr lang="en-US" dirty="0"/>
+              <a:t>History Plots</a:t>
+            </a:r>
+          </a:p>
+        </p:txBody>
+      </p:sp>
+      <p:pic>
+        <p:nvPicPr>
+          <p:cNvPr id="3" name="Picture 2">
+            <a:extLst>
+              <a:ext uri="{FF2B5EF4-FFF2-40B4-BE49-F238E27FC236}">
+                <a16:creationId xmlns:a16="http://schemas.microsoft.com/office/drawing/2014/main" id="{01EE7A77-4376-450F-8C0E-A607950184F6}"/>
+              </a:ext>
+            </a:extLst>
+          </p:cNvPr>
+          <p:cNvPicPr>
+            <a:picLocks noChangeAspect="1"/>
+          </p:cNvPicPr>
+          <p:nvPr/>
+        </p:nvPicPr>
+        <p:blipFill>
+          <a:blip r:embed="rId2"/>
+          <a:stretch>
+            <a:fillRect/>
+          </a:stretch>
+        </p:blipFill>
+        <p:spPr>
+          <a:xfrm>
+            <a:off x="451155" y="1349191"/>
+            <a:ext cx="3473992" cy="2420043"/>
+          </a:xfrm>
+          <a:prstGeom prst="rect">
+            <a:avLst/>
+          </a:prstGeom>
+        </p:spPr>
+      </p:pic>
+      <p:pic>
+        <p:nvPicPr>
+          <p:cNvPr id="4" name="Picture 3">
+            <a:extLst>
+              <a:ext uri="{FF2B5EF4-FFF2-40B4-BE49-F238E27FC236}">
+                <a16:creationId xmlns:a16="http://schemas.microsoft.com/office/drawing/2014/main" id="{70D5F3BB-1A80-454D-988D-E1D4750E90D9}"/>
+              </a:ext>
+            </a:extLst>
+          </p:cNvPr>
+          <p:cNvPicPr>
+            <a:picLocks noChangeAspect="1"/>
+          </p:cNvPicPr>
+          <p:nvPr/>
+        </p:nvPicPr>
+        <p:blipFill>
+          <a:blip r:embed="rId3"/>
+          <a:stretch>
+            <a:fillRect/>
+          </a:stretch>
+        </p:blipFill>
+        <p:spPr>
+          <a:xfrm>
+            <a:off x="4117202" y="1348137"/>
+            <a:ext cx="3620884" cy="2420043"/>
+          </a:xfrm>
+          <a:prstGeom prst="rect">
+            <a:avLst/>
+          </a:prstGeom>
+        </p:spPr>
+      </p:pic>
+      <p:pic>
+        <p:nvPicPr>
+          <p:cNvPr id="5" name="Picture 4">
+            <a:extLst>
+              <a:ext uri="{FF2B5EF4-FFF2-40B4-BE49-F238E27FC236}">
+                <a16:creationId xmlns:a16="http://schemas.microsoft.com/office/drawing/2014/main" id="{1BA517AD-6F2D-482B-A2A2-DBFCFE917F50}"/>
+              </a:ext>
+            </a:extLst>
+          </p:cNvPr>
+          <p:cNvPicPr>
+            <a:picLocks noChangeAspect="1"/>
+          </p:cNvPicPr>
+          <p:nvPr/>
+        </p:nvPicPr>
+        <p:blipFill>
+          <a:blip r:embed="rId4"/>
+          <a:stretch>
+            <a:fillRect/>
+          </a:stretch>
+        </p:blipFill>
+        <p:spPr>
+          <a:xfrm>
+            <a:off x="7947005" y="1348136"/>
+            <a:ext cx="3598850" cy="2420043"/>
+          </a:xfrm>
+          <a:prstGeom prst="rect">
+            <a:avLst/>
+          </a:prstGeom>
+        </p:spPr>
+      </p:pic>
+      <p:pic>
+        <p:nvPicPr>
+          <p:cNvPr id="6" name="Picture 5">
+            <a:extLst>
+              <a:ext uri="{FF2B5EF4-FFF2-40B4-BE49-F238E27FC236}">
+                <a16:creationId xmlns:a16="http://schemas.microsoft.com/office/drawing/2014/main" id="{4AFDAC70-70FF-4429-A93D-5C9D453C73D3}"/>
+              </a:ext>
+            </a:extLst>
+          </p:cNvPr>
+          <p:cNvPicPr>
+            <a:picLocks noChangeAspect="1"/>
+          </p:cNvPicPr>
+          <p:nvPr/>
+        </p:nvPicPr>
+        <p:blipFill>
+          <a:blip r:embed="rId5"/>
+          <a:stretch>
+            <a:fillRect/>
+          </a:stretch>
+        </p:blipFill>
+        <p:spPr>
+          <a:xfrm>
+            <a:off x="2156936" y="4259095"/>
+            <a:ext cx="3536421" cy="2420043"/>
+          </a:xfrm>
+          <a:prstGeom prst="rect">
+            <a:avLst/>
+          </a:prstGeom>
+        </p:spPr>
+      </p:pic>
+      <p:pic>
+        <p:nvPicPr>
+          <p:cNvPr id="7" name="Picture 6">
+            <a:extLst>
+              <a:ext uri="{FF2B5EF4-FFF2-40B4-BE49-F238E27FC236}">
+                <a16:creationId xmlns:a16="http://schemas.microsoft.com/office/drawing/2014/main" id="{DA3E2F94-9BEE-4A5A-9D8F-3714FCD52832}"/>
+              </a:ext>
+            </a:extLst>
+          </p:cNvPr>
+          <p:cNvPicPr>
+            <a:picLocks noChangeAspect="1"/>
+          </p:cNvPicPr>
+          <p:nvPr/>
+        </p:nvPicPr>
+        <p:blipFill>
+          <a:blip r:embed="rId6"/>
+          <a:stretch>
+            <a:fillRect/>
+          </a:stretch>
+        </p:blipFill>
+        <p:spPr>
+          <a:xfrm>
+            <a:off x="6178794" y="4259094"/>
+            <a:ext cx="3536421" cy="2420043"/>
+          </a:xfrm>
+          <a:prstGeom prst="rect">
+            <a:avLst/>
+          </a:prstGeom>
+        </p:spPr>
+      </p:pic>
+      <p:sp>
+        <p:nvSpPr>
+          <p:cNvPr id="8" name="TextBox 7">
+            <a:extLst>
+              <a:ext uri="{FF2B5EF4-FFF2-40B4-BE49-F238E27FC236}">
+                <a16:creationId xmlns:a16="http://schemas.microsoft.com/office/drawing/2014/main" id="{DD194B80-F244-40FF-A5C8-55B989FC9477}"/>
+              </a:ext>
+            </a:extLst>
+          </p:cNvPr>
+          <p:cNvSpPr txBox="1"/>
+          <p:nvPr/>
+        </p:nvSpPr>
+        <p:spPr>
+          <a:xfrm>
+            <a:off x="1661041" y="3887150"/>
+            <a:ext cx="724878" cy="369332"/>
+          </a:xfrm>
+          <a:prstGeom prst="rect">
+            <a:avLst/>
+          </a:prstGeom>
+          <a:noFill/>
+        </p:spPr>
+        <p:txBody>
+          <a:bodyPr wrap="none" rtlCol="0">
+            <a:spAutoFit/>
+          </a:bodyPr>
+          <a:lstStyle/>
+          <a:p>
+            <a:r>
+              <a:rPr lang="en-US" dirty="0"/>
+              <a:t>Alpha</a:t>
+            </a:r>
+          </a:p>
+        </p:txBody>
+      </p:sp>
+      <p:sp>
+        <p:nvSpPr>
+          <p:cNvPr id="21" name="TextBox 20">
+            <a:extLst>
+              <a:ext uri="{FF2B5EF4-FFF2-40B4-BE49-F238E27FC236}">
+                <a16:creationId xmlns:a16="http://schemas.microsoft.com/office/drawing/2014/main" id="{C95CBA2A-2779-420C-9290-9411B3CBEF2A}"/>
+              </a:ext>
+            </a:extLst>
+          </p:cNvPr>
+          <p:cNvSpPr txBox="1"/>
+          <p:nvPr/>
+        </p:nvSpPr>
+        <p:spPr>
+          <a:xfrm>
+            <a:off x="9383991" y="3887150"/>
+            <a:ext cx="522900" cy="369332"/>
+          </a:xfrm>
+          <a:prstGeom prst="rect">
+            <a:avLst/>
+          </a:prstGeom>
+          <a:noFill/>
+        </p:spPr>
+        <p:txBody>
+          <a:bodyPr wrap="none" rtlCol="0">
+            <a:spAutoFit/>
+          </a:bodyPr>
+          <a:lstStyle/>
+          <a:p>
+            <a:r>
+              <a:rPr lang="en-US" dirty="0"/>
+              <a:t>S_0</a:t>
+            </a:r>
+          </a:p>
+        </p:txBody>
+      </p:sp>
+      <p:sp>
+        <p:nvSpPr>
+          <p:cNvPr id="22" name="TextBox 21">
+            <a:extLst>
+              <a:ext uri="{FF2B5EF4-FFF2-40B4-BE49-F238E27FC236}">
+                <a16:creationId xmlns:a16="http://schemas.microsoft.com/office/drawing/2014/main" id="{E869EBA6-772E-4E9B-AE88-4848CE327154}"/>
+              </a:ext>
+            </a:extLst>
+          </p:cNvPr>
+          <p:cNvSpPr txBox="1"/>
+          <p:nvPr/>
+        </p:nvSpPr>
+        <p:spPr>
+          <a:xfrm>
+            <a:off x="5565205" y="3887150"/>
+            <a:ext cx="513602" cy="369332"/>
+          </a:xfrm>
+          <a:prstGeom prst="rect">
+            <a:avLst/>
+          </a:prstGeom>
+          <a:noFill/>
+        </p:spPr>
+        <p:txBody>
+          <a:bodyPr wrap="none" rtlCol="0">
+            <a:spAutoFit/>
+          </a:bodyPr>
+          <a:lstStyle/>
+          <a:p>
+            <a:r>
+              <a:rPr lang="en-US" dirty="0" err="1"/>
+              <a:t>Teq</a:t>
+            </a:r>
+            <a:endParaRPr lang="en-US" dirty="0"/>
+          </a:p>
+        </p:txBody>
+      </p:sp>
+      <p:sp>
+        <p:nvSpPr>
+          <p:cNvPr id="23" name="TextBox 22">
+            <a:extLst>
+              <a:ext uri="{FF2B5EF4-FFF2-40B4-BE49-F238E27FC236}">
+                <a16:creationId xmlns:a16="http://schemas.microsoft.com/office/drawing/2014/main" id="{4F667A8B-0417-4A01-9DB5-122C4BA2363F}"/>
+              </a:ext>
+            </a:extLst>
+          </p:cNvPr>
+          <p:cNvSpPr txBox="1"/>
+          <p:nvPr/>
+        </p:nvSpPr>
+        <p:spPr>
+          <a:xfrm>
+            <a:off x="946621" y="5099783"/>
+            <a:ext cx="553357" cy="369332"/>
+          </a:xfrm>
+          <a:prstGeom prst="rect">
+            <a:avLst/>
+          </a:prstGeom>
+          <a:noFill/>
+        </p:spPr>
+        <p:txBody>
+          <a:bodyPr wrap="none" rtlCol="0">
+            <a:spAutoFit/>
+          </a:bodyPr>
+          <a:lstStyle/>
+          <a:p>
+            <a:r>
+              <a:rPr lang="en-US" dirty="0"/>
+              <a:t>Rho</a:t>
+            </a:r>
+          </a:p>
+        </p:txBody>
+      </p:sp>
+      <p:sp>
+        <p:nvSpPr>
+          <p:cNvPr id="24" name="TextBox 23">
+            <a:extLst>
+              <a:ext uri="{FF2B5EF4-FFF2-40B4-BE49-F238E27FC236}">
+                <a16:creationId xmlns:a16="http://schemas.microsoft.com/office/drawing/2014/main" id="{49C27530-6180-4F47-885E-AD6A062AB9BB}"/>
+              </a:ext>
+            </a:extLst>
+          </p:cNvPr>
+          <p:cNvSpPr txBox="1"/>
+          <p:nvPr/>
+        </p:nvSpPr>
+        <p:spPr>
+          <a:xfrm>
+            <a:off x="10200652" y="4961283"/>
+            <a:ext cx="1566326" cy="646331"/>
+          </a:xfrm>
+          <a:prstGeom prst="rect">
+            <a:avLst/>
+          </a:prstGeom>
+          <a:noFill/>
+        </p:spPr>
+        <p:txBody>
+          <a:bodyPr wrap="none" rtlCol="0">
+            <a:spAutoFit/>
+          </a:bodyPr>
+          <a:lstStyle/>
+          <a:p>
+            <a:r>
+              <a:rPr lang="en-US" dirty="0"/>
+              <a:t>Uncertainty in </a:t>
+            </a:r>
+          </a:p>
+          <a:p>
+            <a:r>
+              <a:rPr lang="en-US" dirty="0"/>
+              <a:t>AR1 Matrix</a:t>
+            </a:r>
+          </a:p>
+        </p:txBody>
+      </p:sp>
+    </p:spTree>
+    <p:extLst>
+      <p:ext uri="{BB962C8B-B14F-4D97-AF65-F5344CB8AC3E}">
+        <p14:creationId xmlns:p14="http://schemas.microsoft.com/office/powerpoint/2010/main" val="3257756258"/>
+      </p:ext>
+    </p:extLst>
+  </p:cSld>
+  <p:clrMapOvr>
+    <a:masterClrMapping/>
+  </p:clrMapOvr>
+</p:sld>
+</file>
+
+<file path=ppt/slides/slide11.xml><?xml version="1.0" encoding="utf-8"?>
+<p:sld xmlns:a="http://schemas.openxmlformats.org/drawingml/2006/main" xmlns:r="http://schemas.openxmlformats.org/officeDocument/2006/relationships" xmlns:p="http://schemas.openxmlformats.org/presentationml/2006/main">
+  <p:cSld>
+    <p:spTree>
+      <p:nvGrpSpPr>
+        <p:cNvPr id="1" name=""/>
+        <p:cNvGrpSpPr/>
+        <p:nvPr/>
+      </p:nvGrpSpPr>
+      <p:grpSpPr>
+        <a:xfrm>
+          <a:off x="0" y="0"/>
+          <a:ext cx="0" cy="0"/>
+          <a:chOff x="0" y="0"/>
+          <a:chExt cx="0" cy="0"/>
+        </a:xfrm>
+      </p:grpSpPr>
+      <p:sp>
+        <p:nvSpPr>
+          <p:cNvPr id="2" name="Title 1">
+            <a:extLst>
+              <a:ext uri="{FF2B5EF4-FFF2-40B4-BE49-F238E27FC236}">
                 <a16:creationId xmlns:a16="http://schemas.microsoft.com/office/drawing/2014/main" id="{4642D8FD-5E3D-4045-B506-E80DB9941D5A}"/>
               </a:ext>
             </a:extLst>
@@ -4518,7 +4997,7 @@
 </p:sld>
 </file>
 
-<file path=ppt/slides/slide11.xml><?xml version="1.0" encoding="utf-8"?>
+<file path=ppt/slides/slide12.xml><?xml version="1.0" encoding="utf-8"?>
 <p:sld xmlns:a="http://schemas.openxmlformats.org/drawingml/2006/main" xmlns:r="http://schemas.openxmlformats.org/officeDocument/2006/relationships" xmlns:p="http://schemas.openxmlformats.org/presentationml/2006/main">
   <p:cSld>
     <p:spTree>
@@ -4831,8 +5310,8 @@
           </p:sp>
         </mc:Fallback>
       </mc:AlternateContent>
-      <mc:AlternateContent xmlns:mc="http://schemas.openxmlformats.org/markup-compatibility/2006">
-        <mc:Choice xmlns:a14="http://schemas.microsoft.com/office/drawing/2010/main" Requires="a14">
+      <mc:AlternateContent xmlns:mc="http://schemas.openxmlformats.org/markup-compatibility/2006" xmlns:a14="http://schemas.microsoft.com/office/drawing/2010/main">
+        <mc:Choice Requires="a14">
           <p:graphicFrame>
             <p:nvGraphicFramePr>
               <p:cNvPr id="6" name="Table 5">
@@ -6625,7 +7104,7 @@
             </a:graphic>
           </p:graphicFrame>
         </mc:Choice>
-        <mc:Fallback>
+        <mc:Fallback xmlns="">
           <p:graphicFrame>
             <p:nvGraphicFramePr>
               <p:cNvPr id="6" name="Table 5">
@@ -8100,7 +8579,7 @@
 </p:sld>
 </file>
 
-<file path=ppt/slides/slide12.xml><?xml version="1.0" encoding="utf-8"?>
+<file path=ppt/slides/slide13.xml><?xml version="1.0" encoding="utf-8"?>
 <p:sld xmlns:a="http://schemas.openxmlformats.org/drawingml/2006/main" xmlns:r="http://schemas.openxmlformats.org/officeDocument/2006/relationships" xmlns:p="http://schemas.openxmlformats.org/presentationml/2006/main">
   <p:cSld>
     <p:spTree>
@@ -8200,7 +8679,7 @@
 </p:sld>
 </file>
 
-<file path=ppt/slides/slide13.xml><?xml version="1.0" encoding="utf-8"?>
+<file path=ppt/slides/slide14.xml><?xml version="1.0" encoding="utf-8"?>
 <p:sld xmlns:a="http://schemas.openxmlformats.org/drawingml/2006/main" xmlns:r="http://schemas.openxmlformats.org/officeDocument/2006/relationships" xmlns:p="http://schemas.openxmlformats.org/presentationml/2006/main">
   <p:cSld>
     <p:spTree>
@@ -8245,8 +8724,8 @@
           </a:p>
         </p:txBody>
       </p:sp>
-      <mc:AlternateContent xmlns:mc="http://schemas.openxmlformats.org/markup-compatibility/2006">
-        <mc:Choice xmlns:a14="http://schemas.microsoft.com/office/drawing/2010/main" Requires="a14">
+      <mc:AlternateContent xmlns:mc="http://schemas.openxmlformats.org/markup-compatibility/2006" xmlns:a14="http://schemas.microsoft.com/office/drawing/2010/main">
+        <mc:Choice Requires="a14">
           <p:graphicFrame>
             <p:nvGraphicFramePr>
               <p:cNvPr id="4" name="Table 3">
@@ -8913,7 +9392,7 @@
             </a:graphic>
           </p:graphicFrame>
         </mc:Choice>
-        <mc:Fallback>
+        <mc:Fallback xmlns="">
           <p:graphicFrame>
             <p:nvGraphicFramePr>
               <p:cNvPr id="4" name="Table 3">
@@ -9491,8 +9970,8 @@
           </p:graphicFrame>
         </mc:Fallback>
       </mc:AlternateContent>
-      <mc:AlternateContent xmlns:mc="http://schemas.openxmlformats.org/markup-compatibility/2006">
-        <mc:Choice xmlns:a14="http://schemas.microsoft.com/office/drawing/2010/main" Requires="a14">
+      <mc:AlternateContent xmlns:mc="http://schemas.openxmlformats.org/markup-compatibility/2006" xmlns:a14="http://schemas.microsoft.com/office/drawing/2010/main">
+        <mc:Choice Requires="a14">
           <p:sp>
             <p:nvSpPr>
               <p:cNvPr id="5" name="TextBox 4">
@@ -9521,6 +10000,7 @@
               </a:bodyPr>
               <a:lstStyle/>
               <a:p>
+                <a:pPr/>
                 <a14:m>
                   <m:oMathPara xmlns:m="http://schemas.openxmlformats.org/officeDocument/2006/math">
                     <m:oMathParaPr>
@@ -9547,7 +10027,7 @@
             </p:txBody>
           </p:sp>
         </mc:Choice>
-        <mc:Fallback>
+        <mc:Fallback xmlns="">
           <p:sp>
             <p:nvSpPr>
               <p:cNvPr id="5" name="TextBox 4">
@@ -9738,7 +10218,7 @@
 </p:sld>
 </file>
 
-<file path=ppt/slides/slide14.xml><?xml version="1.0" encoding="utf-8"?>
+<file path=ppt/slides/slide15.xml><?xml version="1.0" encoding="utf-8"?>
 <p:sld xmlns:a="http://schemas.openxmlformats.org/drawingml/2006/main" xmlns:r="http://schemas.openxmlformats.org/officeDocument/2006/relationships" xmlns:p="http://schemas.openxmlformats.org/presentationml/2006/main">
   <p:cSld>
     <p:spTree>
@@ -9879,7 +10359,9 @@
           </a:lstStyle>
           <a:p>
             <a:r>
-              <a:rPr lang="en-US" dirty="0"/>
+              <a:rPr lang="en-US" dirty="0">
+                <a:latin typeface="Bahnschrift" panose="020B0502040204020203" pitchFamily="34" charset="0"/>
+              </a:rPr>
               <a:t>What we’re going to do</a:t>
             </a:r>
           </a:p>
@@ -10078,24 +10560,32 @@
           </a:lstStyle>
           <a:p>
             <a:r>
-              <a:rPr lang="en-US" dirty="0"/>
+              <a:rPr lang="en-US" dirty="0">
+                <a:latin typeface="Bahnschrift" panose="020B0502040204020203" pitchFamily="34" charset="0"/>
+              </a:rPr>
               <a:t>MCMC model which takes in sea-level values and gives us estimates on temperature </a:t>
             </a:r>
           </a:p>
           <a:p>
             <a:r>
-              <a:rPr lang="en-US" dirty="0"/>
+              <a:rPr lang="en-US" dirty="0">
+                <a:latin typeface="Bahnschrift" panose="020B0502040204020203" pitchFamily="34" charset="0"/>
+              </a:rPr>
               <a:t>Combined and easy-to-use python script</a:t>
             </a:r>
           </a:p>
           <a:p>
             <a:r>
-              <a:rPr lang="en-US" dirty="0"/>
+              <a:rPr lang="en-US" dirty="0">
+                <a:latin typeface="Bahnschrift" panose="020B0502040204020203" pitchFamily="34" charset="0"/>
+              </a:rPr>
               <a:t>AR1 matrix which includes correlated uncertainties</a:t>
             </a:r>
           </a:p>
           <a:p>
-            <a:endParaRPr lang="en-US" dirty="0"/>
+            <a:endParaRPr lang="en-US" dirty="0">
+              <a:latin typeface="Bahnschrift" panose="020B0502040204020203" pitchFamily="34" charset="0"/>
+            </a:endParaRPr>
           </a:p>
         </p:txBody>
       </p:sp>
@@ -10112,7 +10602,7 @@
 </p:sld>
 </file>
 
-<file path=ppt/slides/slide15.xml><?xml version="1.0" encoding="utf-8"?>
+<file path=ppt/slides/slide16.xml><?xml version="1.0" encoding="utf-8"?>
 <p:sld xmlns:a="http://schemas.openxmlformats.org/drawingml/2006/main" xmlns:r="http://schemas.openxmlformats.org/officeDocument/2006/relationships" xmlns:p="http://schemas.openxmlformats.org/presentationml/2006/main">
   <p:cSld>
     <p:spTree>
@@ -10256,7 +10746,7 @@
 </p:sld>
 </file>
 
-<file path=ppt/slides/slide16.xml><?xml version="1.0" encoding="utf-8"?>
+<file path=ppt/slides/slide17.xml><?xml version="1.0" encoding="utf-8"?>
 <p:sld xmlns:a="http://schemas.openxmlformats.org/drawingml/2006/main" xmlns:r="http://schemas.openxmlformats.org/officeDocument/2006/relationships" xmlns:p="http://schemas.openxmlformats.org/presentationml/2006/main" show="0">
   <p:cSld>
     <p:spTree>
@@ -10273,6 +10763,34 @@
           <a:chExt cx="0" cy="0"/>
         </a:xfrm>
       </p:grpSpPr>
+      <p:sp>
+        <p:nvSpPr>
+          <p:cNvPr id="4" name="Title 1">
+            <a:extLst>
+              <a:ext uri="{FF2B5EF4-FFF2-40B4-BE49-F238E27FC236}">
+                <a16:creationId xmlns:a16="http://schemas.microsoft.com/office/drawing/2014/main" id="{56632757-107D-438A-BA93-6EBF49DFD064}"/>
+              </a:ext>
+            </a:extLst>
+          </p:cNvPr>
+          <p:cNvSpPr>
+            <a:spLocks noGrp="1"/>
+          </p:cNvSpPr>
+          <p:nvPr>
+            <p:ph type="title"/>
+          </p:nvPr>
+        </p:nvSpPr>
+        <p:spPr/>
+        <p:txBody>
+          <a:bodyPr/>
+          <a:lstStyle/>
+          <a:p>
+            <a:r>
+              <a:rPr lang="en-US" dirty="0"/>
+              <a:t>Building the AR1 Matrix</a:t>
+            </a:r>
+          </a:p>
+        </p:txBody>
+      </p:sp>
       <mc:AlternateContent xmlns:mc="http://schemas.openxmlformats.org/markup-compatibility/2006" xmlns:a14="http://schemas.microsoft.com/office/drawing/2010/main">
         <mc:Choice Requires="a14">
           <p:sp>
@@ -11020,43 +11538,40 @@
           </p:sp>
         </mc:Fallback>
       </mc:AlternateContent>
-      <p:sp>
-        <p:nvSpPr>
-          <p:cNvPr id="4" name="Title 1">
-            <a:extLst>
-              <a:ext uri="{FF2B5EF4-FFF2-40B4-BE49-F238E27FC236}">
-                <a16:creationId xmlns:a16="http://schemas.microsoft.com/office/drawing/2014/main" id="{56632757-107D-438A-BA93-6EBF49DFD064}"/>
-              </a:ext>
-            </a:extLst>
-          </p:cNvPr>
-          <p:cNvSpPr>
-            <a:spLocks noGrp="1"/>
-          </p:cNvSpPr>
-          <p:nvPr>
-            <p:ph type="title"/>
-          </p:nvPr>
-        </p:nvSpPr>
-        <p:spPr>
-          <a:xfrm>
-            <a:off x="838200" y="365126"/>
-            <a:ext cx="10515600" cy="950328"/>
-          </a:xfrm>
-        </p:spPr>
-        <p:txBody>
-          <a:bodyPr/>
-          <a:lstStyle/>
-          <a:p>
-            <a:r>
-              <a:rPr lang="en-US" dirty="0"/>
-              <a:t>Building the AR1 Matrix</a:t>
-            </a:r>
-          </a:p>
-        </p:txBody>
-      </p:sp>
     </p:spTree>
     <p:extLst>
       <p:ext uri="{BB962C8B-B14F-4D97-AF65-F5344CB8AC3E}">
         <p14:creationId xmlns:p14="http://schemas.microsoft.com/office/powerpoint/2010/main" val="2434353050"/>
+      </p:ext>
+    </p:extLst>
+  </p:cSld>
+  <p:clrMapOvr>
+    <a:masterClrMapping/>
+  </p:clrMapOvr>
+</p:sld>
+</file>
+
+<file path=ppt/slides/slide18.xml><?xml version="1.0" encoding="utf-8"?>
+<p:sld xmlns:a="http://schemas.openxmlformats.org/drawingml/2006/main" xmlns:r="http://schemas.openxmlformats.org/officeDocument/2006/relationships" xmlns:p="http://schemas.openxmlformats.org/presentationml/2006/main">
+  <p:cSld>
+    <p:spTree>
+      <p:nvGrpSpPr>
+        <p:cNvPr id="1" name=""/>
+        <p:cNvGrpSpPr/>
+        <p:nvPr/>
+      </p:nvGrpSpPr>
+      <p:grpSpPr>
+        <a:xfrm>
+          <a:off x="0" y="0"/>
+          <a:ext cx="0" cy="0"/>
+          <a:chOff x="0" y="0"/>
+          <a:chExt cx="0" cy="0"/>
+        </a:xfrm>
+      </p:grpSpPr>
+    </p:spTree>
+    <p:extLst>
+      <p:ext uri="{BB962C8B-B14F-4D97-AF65-F5344CB8AC3E}">
+        <p14:creationId xmlns:p14="http://schemas.microsoft.com/office/powerpoint/2010/main" val="2018495462"/>
       </p:ext>
     </p:extLst>
   </p:cSld>
@@ -11139,42 +11654,6 @@
           </a:p>
         </p:txBody>
       </p:sp>
-      <p:pic>
-        <p:nvPicPr>
-          <p:cNvPr id="5" name="Picture 4" descr="A close up of a map&#10;&#10;Description generated with high confidence">
-            <a:extLst>
-              <a:ext uri="{FF2B5EF4-FFF2-40B4-BE49-F238E27FC236}">
-                <a16:creationId xmlns:a16="http://schemas.microsoft.com/office/drawing/2014/main" id="{08FDA5AB-AC10-4D16-A31E-560E06A28E45}"/>
-              </a:ext>
-            </a:extLst>
-          </p:cNvPr>
-          <p:cNvPicPr>
-            <a:picLocks noChangeAspect="1"/>
-          </p:cNvPicPr>
-          <p:nvPr/>
-        </p:nvPicPr>
-        <p:blipFill>
-          <a:blip r:embed="rId3">
-            <a:extLst>
-              <a:ext uri="{28A0092B-C50C-407E-A947-70E740481C1C}">
-                <a14:useLocalDpi xmlns:a14="http://schemas.microsoft.com/office/drawing/2010/main" val="0"/>
-              </a:ext>
-            </a:extLst>
-          </a:blip>
-          <a:stretch>
-            <a:fillRect/>
-          </a:stretch>
-        </p:blipFill>
-        <p:spPr>
-          <a:xfrm>
-            <a:off x="1509736" y="3080084"/>
-            <a:ext cx="4490012" cy="3412790"/>
-          </a:xfrm>
-          <a:prstGeom prst="rect">
-            <a:avLst/>
-          </a:prstGeom>
-        </p:spPr>
-      </p:pic>
       <p:sp>
         <p:nvSpPr>
           <p:cNvPr id="6" name="TextBox 5">
@@ -11189,7 +11668,7 @@
         </p:nvSpPr>
         <p:spPr>
           <a:xfrm>
-            <a:off x="6192254" y="4008157"/>
+            <a:off x="6446251" y="4008157"/>
             <a:ext cx="5257800" cy="1815882"/>
           </a:xfrm>
           <a:prstGeom prst="rect">
@@ -11210,6 +11689,504 @@
           </a:p>
         </p:txBody>
       </p:sp>
+      <p:grpSp>
+        <p:nvGrpSpPr>
+          <p:cNvPr id="7" name="Group 6">
+            <a:extLst>
+              <a:ext uri="{FF2B5EF4-FFF2-40B4-BE49-F238E27FC236}">
+                <a16:creationId xmlns:a16="http://schemas.microsoft.com/office/drawing/2014/main" id="{90E7C165-7543-4178-BBDD-3967AB63B6C3}"/>
+              </a:ext>
+            </a:extLst>
+          </p:cNvPr>
+          <p:cNvGrpSpPr/>
+          <p:nvPr/>
+        </p:nvGrpSpPr>
+        <p:grpSpPr>
+          <a:xfrm>
+            <a:off x="318612" y="3556000"/>
+            <a:ext cx="6115686" cy="3159971"/>
+            <a:chOff x="0" y="0"/>
+            <a:chExt cx="12192000" cy="6858000"/>
+          </a:xfrm>
+        </p:grpSpPr>
+        <p:pic>
+          <p:nvPicPr>
+            <p:cNvPr id="8" name="Picture 7" descr="A close up of a beach&#10;&#10;Description generated with high confidence">
+              <a:extLst>
+                <a:ext uri="{FF2B5EF4-FFF2-40B4-BE49-F238E27FC236}">
+                  <a16:creationId xmlns:a16="http://schemas.microsoft.com/office/drawing/2014/main" id="{AE53D155-7F4B-47D8-8A35-E288DAAD6F36}"/>
+                </a:ext>
+              </a:extLst>
+            </p:cNvPr>
+            <p:cNvPicPr>
+              <a:picLocks noChangeAspect="1"/>
+            </p:cNvPicPr>
+            <p:nvPr/>
+          </p:nvPicPr>
+          <p:blipFill>
+            <a:blip r:embed="rId3">
+              <a:extLst>
+                <a:ext uri="{28A0092B-C50C-407E-A947-70E740481C1C}">
+                  <a14:useLocalDpi xmlns:a14="http://schemas.microsoft.com/office/drawing/2010/main" val="0"/>
+                </a:ext>
+              </a:extLst>
+            </a:blip>
+            <a:stretch>
+              <a:fillRect/>
+            </a:stretch>
+          </p:blipFill>
+          <p:spPr>
+            <a:xfrm>
+              <a:off x="0" y="0"/>
+              <a:ext cx="12192000" cy="6858000"/>
+            </a:xfrm>
+            <a:prstGeom prst="rect">
+              <a:avLst/>
+            </a:prstGeom>
+          </p:spPr>
+        </p:pic>
+        <p:sp>
+          <p:nvSpPr>
+            <p:cNvPr id="9" name="TextBox 8">
+              <a:extLst>
+                <a:ext uri="{FF2B5EF4-FFF2-40B4-BE49-F238E27FC236}">
+                  <a16:creationId xmlns:a16="http://schemas.microsoft.com/office/drawing/2014/main" id="{9317079B-A5F3-475F-848F-B0B52AD2E559}"/>
+                </a:ext>
+              </a:extLst>
+            </p:cNvPr>
+            <p:cNvSpPr txBox="1"/>
+            <p:nvPr/>
+          </p:nvSpPr>
+          <p:spPr>
+            <a:xfrm>
+              <a:off x="9247228" y="5991198"/>
+              <a:ext cx="1390830" cy="369332"/>
+            </a:xfrm>
+            <a:prstGeom prst="rect">
+              <a:avLst/>
+            </a:prstGeom>
+            <a:noFill/>
+          </p:spPr>
+          <p:txBody>
+            <a:bodyPr wrap="none" rtlCol="0">
+              <a:spAutoFit/>
+            </a:bodyPr>
+            <a:lstStyle/>
+            <a:p>
+              <a:pPr algn="ctr"/>
+              <a:r>
+                <a:rPr lang="en-US" dirty="0"/>
+                <a:t>DEEP OCEAN</a:t>
+              </a:r>
+            </a:p>
+          </p:txBody>
+        </p:sp>
+        <p:sp>
+          <p:nvSpPr>
+            <p:cNvPr id="10" name="TextBox 9">
+              <a:extLst>
+                <a:ext uri="{FF2B5EF4-FFF2-40B4-BE49-F238E27FC236}">
+                  <a16:creationId xmlns:a16="http://schemas.microsoft.com/office/drawing/2014/main" id="{0ECB96F6-6A65-4740-85DF-DBCE009DE8B4}"/>
+                </a:ext>
+              </a:extLst>
+            </p:cNvPr>
+            <p:cNvSpPr txBox="1"/>
+            <p:nvPr/>
+          </p:nvSpPr>
+          <p:spPr>
+            <a:xfrm>
+              <a:off x="9516533" y="5029199"/>
+              <a:ext cx="852221" cy="369332"/>
+            </a:xfrm>
+            <a:prstGeom prst="rect">
+              <a:avLst/>
+            </a:prstGeom>
+            <a:noFill/>
+          </p:spPr>
+          <p:txBody>
+            <a:bodyPr wrap="none" rtlCol="0">
+              <a:spAutoFit/>
+            </a:bodyPr>
+            <a:lstStyle/>
+            <a:p>
+              <a:pPr algn="ctr"/>
+              <a:r>
+                <a:rPr lang="en-US" dirty="0"/>
+                <a:t>OCEAN</a:t>
+              </a:r>
+            </a:p>
+          </p:txBody>
+        </p:sp>
+        <p:sp>
+          <p:nvSpPr>
+            <p:cNvPr id="11" name="TextBox 10">
+              <a:extLst>
+                <a:ext uri="{FF2B5EF4-FFF2-40B4-BE49-F238E27FC236}">
+                  <a16:creationId xmlns:a16="http://schemas.microsoft.com/office/drawing/2014/main" id="{8A32EE01-46DA-480A-B288-DF58F95AF23C}"/>
+                </a:ext>
+              </a:extLst>
+            </p:cNvPr>
+            <p:cNvSpPr txBox="1"/>
+            <p:nvPr/>
+          </p:nvSpPr>
+          <p:spPr>
+            <a:xfrm>
+              <a:off x="626533" y="3776133"/>
+              <a:ext cx="707245" cy="369332"/>
+            </a:xfrm>
+            <a:prstGeom prst="rect">
+              <a:avLst/>
+            </a:prstGeom>
+            <a:noFill/>
+          </p:spPr>
+          <p:txBody>
+            <a:bodyPr wrap="none" rtlCol="0">
+              <a:spAutoFit/>
+            </a:bodyPr>
+            <a:lstStyle/>
+            <a:p>
+              <a:r>
+                <a:rPr lang="en-US" dirty="0"/>
+                <a:t>LAND</a:t>
+              </a:r>
+            </a:p>
+          </p:txBody>
+        </p:sp>
+        <p:cxnSp>
+          <p:nvCxnSpPr>
+            <p:cNvPr id="12" name="Straight Arrow Connector 11">
+              <a:extLst>
+                <a:ext uri="{FF2B5EF4-FFF2-40B4-BE49-F238E27FC236}">
+                  <a16:creationId xmlns:a16="http://schemas.microsoft.com/office/drawing/2014/main" id="{5D9AB01F-CD89-4E95-95E8-A94CC3988828}"/>
+                </a:ext>
+              </a:extLst>
+            </p:cNvPr>
+            <p:cNvCxnSpPr>
+              <a:cxnSpLocks/>
+            </p:cNvCxnSpPr>
+            <p:nvPr/>
+          </p:nvCxnSpPr>
+          <p:spPr>
+            <a:xfrm flipH="1">
+              <a:off x="6637867" y="1651000"/>
+              <a:ext cx="1405466" cy="452966"/>
+            </a:xfrm>
+            <a:prstGeom prst="straightConnector1">
+              <a:avLst/>
+            </a:prstGeom>
+            <a:ln>
+              <a:tailEnd type="triangle"/>
+            </a:ln>
+          </p:spPr>
+          <p:style>
+            <a:lnRef idx="1">
+              <a:schemeClr val="accent1"/>
+            </a:lnRef>
+            <a:fillRef idx="0">
+              <a:schemeClr val="accent1"/>
+            </a:fillRef>
+            <a:effectRef idx="0">
+              <a:schemeClr val="accent1"/>
+            </a:effectRef>
+            <a:fontRef idx="minor">
+              <a:schemeClr val="tx1"/>
+            </a:fontRef>
+          </p:style>
+        </p:cxnSp>
+        <p:cxnSp>
+          <p:nvCxnSpPr>
+            <p:cNvPr id="13" name="Straight Arrow Connector 12">
+              <a:extLst>
+                <a:ext uri="{FF2B5EF4-FFF2-40B4-BE49-F238E27FC236}">
+                  <a16:creationId xmlns:a16="http://schemas.microsoft.com/office/drawing/2014/main" id="{C831B2DE-7B90-43F6-BB73-CE742A952B70}"/>
+                </a:ext>
+              </a:extLst>
+            </p:cNvPr>
+            <p:cNvCxnSpPr>
+              <a:cxnSpLocks/>
+            </p:cNvCxnSpPr>
+            <p:nvPr/>
+          </p:nvCxnSpPr>
+          <p:spPr>
+            <a:xfrm flipH="1">
+              <a:off x="7154333" y="2269066"/>
+              <a:ext cx="1193801" cy="778934"/>
+            </a:xfrm>
+            <a:prstGeom prst="straightConnector1">
+              <a:avLst/>
+            </a:prstGeom>
+            <a:ln>
+              <a:tailEnd type="triangle"/>
+            </a:ln>
+          </p:spPr>
+          <p:style>
+            <a:lnRef idx="1">
+              <a:schemeClr val="accent1"/>
+            </a:lnRef>
+            <a:fillRef idx="0">
+              <a:schemeClr val="accent1"/>
+            </a:fillRef>
+            <a:effectRef idx="0">
+              <a:schemeClr val="accent1"/>
+            </a:effectRef>
+            <a:fontRef idx="minor">
+              <a:schemeClr val="tx1"/>
+            </a:fontRef>
+          </p:style>
+        </p:cxnSp>
+        <p:cxnSp>
+          <p:nvCxnSpPr>
+            <p:cNvPr id="14" name="Straight Arrow Connector 13">
+              <a:extLst>
+                <a:ext uri="{FF2B5EF4-FFF2-40B4-BE49-F238E27FC236}">
+                  <a16:creationId xmlns:a16="http://schemas.microsoft.com/office/drawing/2014/main" id="{CCADAF8C-B7BC-465E-A457-D4E70A582E25}"/>
+                </a:ext>
+              </a:extLst>
+            </p:cNvPr>
+            <p:cNvCxnSpPr>
+              <a:cxnSpLocks/>
+            </p:cNvCxnSpPr>
+            <p:nvPr/>
+          </p:nvCxnSpPr>
+          <p:spPr>
+            <a:xfrm flipH="1">
+              <a:off x="7988299" y="2666999"/>
+              <a:ext cx="736600" cy="1259932"/>
+            </a:xfrm>
+            <a:prstGeom prst="straightConnector1">
+              <a:avLst/>
+            </a:prstGeom>
+            <a:ln>
+              <a:tailEnd type="triangle"/>
+            </a:ln>
+          </p:spPr>
+          <p:style>
+            <a:lnRef idx="1">
+              <a:schemeClr val="accent1"/>
+            </a:lnRef>
+            <a:fillRef idx="0">
+              <a:schemeClr val="accent1"/>
+            </a:fillRef>
+            <a:effectRef idx="0">
+              <a:schemeClr val="accent1"/>
+            </a:effectRef>
+            <a:fontRef idx="minor">
+              <a:schemeClr val="tx1"/>
+            </a:fontRef>
+          </p:style>
+        </p:cxnSp>
+        <p:sp>
+          <p:nvSpPr>
+            <p:cNvPr id="15" name="TextBox 14">
+              <a:extLst>
+                <a:ext uri="{FF2B5EF4-FFF2-40B4-BE49-F238E27FC236}">
+                  <a16:creationId xmlns:a16="http://schemas.microsoft.com/office/drawing/2014/main" id="{D8220945-813C-4100-B4E8-49043195E363}"/>
+                </a:ext>
+              </a:extLst>
+            </p:cNvPr>
+            <p:cNvSpPr txBox="1"/>
+            <p:nvPr/>
+          </p:nvSpPr>
+          <p:spPr>
+            <a:xfrm>
+              <a:off x="8271556" y="1745501"/>
+              <a:ext cx="1566711" cy="646331"/>
+            </a:xfrm>
+            <a:prstGeom prst="rect">
+              <a:avLst/>
+            </a:prstGeom>
+            <a:noFill/>
+          </p:spPr>
+          <p:txBody>
+            <a:bodyPr wrap="none" rtlCol="0">
+              <a:spAutoFit/>
+            </a:bodyPr>
+            <a:lstStyle/>
+            <a:p>
+              <a:pPr algn="ctr"/>
+              <a:r>
+                <a:rPr lang="en-US" dirty="0"/>
+                <a:t>ENERGY FROM</a:t>
+              </a:r>
+            </a:p>
+            <a:p>
+              <a:pPr algn="ctr"/>
+              <a:r>
+                <a:rPr lang="en-US" dirty="0"/>
+                <a:t>SUN</a:t>
+              </a:r>
+            </a:p>
+          </p:txBody>
+        </p:sp>
+        <p:sp>
+          <p:nvSpPr>
+            <p:cNvPr id="16" name="Rectangle 15">
+              <a:extLst>
+                <a:ext uri="{FF2B5EF4-FFF2-40B4-BE49-F238E27FC236}">
+                  <a16:creationId xmlns:a16="http://schemas.microsoft.com/office/drawing/2014/main" id="{D2BE2834-BD8A-49B2-BD33-A893440FD714}"/>
+                </a:ext>
+              </a:extLst>
+            </p:cNvPr>
+            <p:cNvSpPr/>
+            <p:nvPr/>
+          </p:nvSpPr>
+          <p:spPr>
+            <a:xfrm>
+              <a:off x="0" y="3429000"/>
+              <a:ext cx="12192000" cy="367268"/>
+            </a:xfrm>
+            <a:prstGeom prst="rect">
+              <a:avLst/>
+            </a:prstGeom>
+            <a:solidFill>
+              <a:srgbClr val="7F7F7F">
+                <a:alpha val="20000"/>
+              </a:srgbClr>
+            </a:solidFill>
+            <a:ln>
+              <a:solidFill>
+                <a:schemeClr val="tx1">
+                  <a:lumMod val="50000"/>
+                  <a:lumOff val="50000"/>
+                </a:schemeClr>
+              </a:solidFill>
+            </a:ln>
+          </p:spPr>
+          <p:style>
+            <a:lnRef idx="2">
+              <a:schemeClr val="accent1">
+                <a:shade val="50000"/>
+              </a:schemeClr>
+            </a:lnRef>
+            <a:fillRef idx="1">
+              <a:schemeClr val="accent1"/>
+            </a:fillRef>
+            <a:effectRef idx="0">
+              <a:schemeClr val="accent1"/>
+            </a:effectRef>
+            <a:fontRef idx="minor">
+              <a:schemeClr val="lt1"/>
+            </a:fontRef>
+          </p:style>
+          <p:txBody>
+            <a:bodyPr rtlCol="0" anchor="ctr"/>
+            <a:lstStyle/>
+            <a:p>
+              <a:pPr algn="ctr"/>
+              <a:r>
+                <a:rPr lang="en-US" dirty="0"/>
+                <a:t>AEROSOL LAYER</a:t>
+              </a:r>
+            </a:p>
+          </p:txBody>
+        </p:sp>
+        <p:cxnSp>
+          <p:nvCxnSpPr>
+            <p:cNvPr id="17" name="Straight Arrow Connector 16">
+              <a:extLst>
+                <a:ext uri="{FF2B5EF4-FFF2-40B4-BE49-F238E27FC236}">
+                  <a16:creationId xmlns:a16="http://schemas.microsoft.com/office/drawing/2014/main" id="{B7322AAD-19C8-4AEB-9E7D-2FCD07414E7C}"/>
+                </a:ext>
+              </a:extLst>
+            </p:cNvPr>
+            <p:cNvCxnSpPr>
+              <a:cxnSpLocks/>
+            </p:cNvCxnSpPr>
+            <p:nvPr/>
+          </p:nvCxnSpPr>
+          <p:spPr>
+            <a:xfrm>
+              <a:off x="9908776" y="5398531"/>
+              <a:ext cx="0" cy="592667"/>
+            </a:xfrm>
+            <a:prstGeom prst="straightConnector1">
+              <a:avLst/>
+            </a:prstGeom>
+            <a:ln w="57150">
+              <a:solidFill>
+                <a:schemeClr val="bg1"/>
+              </a:solidFill>
+              <a:headEnd type="triangle"/>
+              <a:tailEnd type="triangle"/>
+            </a:ln>
+          </p:spPr>
+          <p:style>
+            <a:lnRef idx="1">
+              <a:schemeClr val="accent1"/>
+            </a:lnRef>
+            <a:fillRef idx="0">
+              <a:schemeClr val="accent1"/>
+            </a:fillRef>
+            <a:effectRef idx="0">
+              <a:schemeClr val="accent1"/>
+            </a:effectRef>
+            <a:fontRef idx="minor">
+              <a:schemeClr val="tx1"/>
+            </a:fontRef>
+          </p:style>
+        </p:cxnSp>
+        <p:sp>
+          <p:nvSpPr>
+            <p:cNvPr id="18" name="Rectangle 17">
+              <a:extLst>
+                <a:ext uri="{FF2B5EF4-FFF2-40B4-BE49-F238E27FC236}">
+                  <a16:creationId xmlns:a16="http://schemas.microsoft.com/office/drawing/2014/main" id="{70BC1E01-291C-48EF-9B85-E906809ADB82}"/>
+                </a:ext>
+              </a:extLst>
+            </p:cNvPr>
+            <p:cNvSpPr/>
+            <p:nvPr/>
+          </p:nvSpPr>
+          <p:spPr>
+            <a:xfrm>
+              <a:off x="3674533" y="6158931"/>
+              <a:ext cx="4597023" cy="546669"/>
+            </a:xfrm>
+            <a:prstGeom prst="rect">
+              <a:avLst/>
+            </a:prstGeom>
+            <a:solidFill>
+              <a:schemeClr val="bg1"/>
+            </a:solidFill>
+            <a:ln>
+              <a:solidFill>
+                <a:schemeClr val="tx1"/>
+              </a:solidFill>
+            </a:ln>
+          </p:spPr>
+          <p:style>
+            <a:lnRef idx="2">
+              <a:schemeClr val="accent1">
+                <a:shade val="50000"/>
+              </a:schemeClr>
+            </a:lnRef>
+            <a:fillRef idx="1">
+              <a:schemeClr val="accent1"/>
+            </a:fillRef>
+            <a:effectRef idx="0">
+              <a:schemeClr val="accent1"/>
+            </a:effectRef>
+            <a:fontRef idx="minor">
+              <a:schemeClr val="lt1"/>
+            </a:fontRef>
+          </p:style>
+          <p:txBody>
+            <a:bodyPr rtlCol="0" anchor="ctr"/>
+            <a:lstStyle/>
+            <a:p>
+              <a:pPr algn="ctr"/>
+              <a:r>
+                <a:rPr lang="en-US" dirty="0">
+                  <a:solidFill>
+                    <a:sysClr val="windowText" lastClr="000000"/>
+                  </a:solidFill>
+                </a:rPr>
+                <a:t>RADIATIVE ENERGY</a:t>
+              </a:r>
+            </a:p>
+          </p:txBody>
+        </p:sp>
+      </p:grpSp>
     </p:spTree>
     <p:extLst>
       <p:ext uri="{BB962C8B-B14F-4D97-AF65-F5344CB8AC3E}">
@@ -11224,6 +12201,92 @@
 </file>
 
 <file path=ppt/slides/slide3.xml><?xml version="1.0" encoding="utf-8"?>
+<p:sld xmlns:a="http://schemas.openxmlformats.org/drawingml/2006/main" xmlns:r="http://schemas.openxmlformats.org/officeDocument/2006/relationships" xmlns:p="http://schemas.openxmlformats.org/presentationml/2006/main">
+  <p:cSld>
+    <p:spTree>
+      <p:nvGrpSpPr>
+        <p:cNvPr id="1" name=""/>
+        <p:cNvGrpSpPr/>
+        <p:nvPr/>
+      </p:nvGrpSpPr>
+      <p:grpSpPr>
+        <a:xfrm>
+          <a:off x="0" y="0"/>
+          <a:ext cx="0" cy="0"/>
+          <a:chOff x="0" y="0"/>
+          <a:chExt cx="0" cy="0"/>
+        </a:xfrm>
+      </p:grpSpPr>
+      <p:sp>
+        <p:nvSpPr>
+          <p:cNvPr id="2" name="Title 1">
+            <a:extLst>
+              <a:ext uri="{FF2B5EF4-FFF2-40B4-BE49-F238E27FC236}">
+                <a16:creationId xmlns:a16="http://schemas.microsoft.com/office/drawing/2014/main" id="{034A4F87-0806-4F3D-B4DC-063BF2768860}"/>
+              </a:ext>
+            </a:extLst>
+          </p:cNvPr>
+          <p:cNvSpPr>
+            <a:spLocks noGrp="1"/>
+          </p:cNvSpPr>
+          <p:nvPr>
+            <p:ph type="title"/>
+          </p:nvPr>
+        </p:nvSpPr>
+        <p:spPr/>
+        <p:txBody>
+          <a:bodyPr/>
+          <a:lstStyle/>
+          <a:p>
+            <a:r>
+              <a:rPr lang="en-US" dirty="0"/>
+              <a:t>Goal</a:t>
+            </a:r>
+          </a:p>
+        </p:txBody>
+      </p:sp>
+      <p:sp>
+        <p:nvSpPr>
+          <p:cNvPr id="3" name="Content Placeholder 2">
+            <a:extLst>
+              <a:ext uri="{FF2B5EF4-FFF2-40B4-BE49-F238E27FC236}">
+                <a16:creationId xmlns:a16="http://schemas.microsoft.com/office/drawing/2014/main" id="{6C88DE16-C4CA-40DD-8257-596CBBBD7832}"/>
+              </a:ext>
+            </a:extLst>
+          </p:cNvPr>
+          <p:cNvSpPr>
+            <a:spLocks noGrp="1"/>
+          </p:cNvSpPr>
+          <p:nvPr>
+            <p:ph idx="1"/>
+          </p:nvPr>
+        </p:nvSpPr>
+        <p:spPr/>
+        <p:txBody>
+          <a:bodyPr/>
+          <a:lstStyle/>
+          <a:p>
+            <a:r>
+              <a:rPr lang="en-US" dirty="0"/>
+              <a:t>We want to be able to model the sea-level rise but we also want to account for the uncertainties with correlated parameters. </a:t>
+            </a:r>
+          </a:p>
+        </p:txBody>
+      </p:sp>
+    </p:spTree>
+    <p:extLst>
+      <p:ext uri="{BB962C8B-B14F-4D97-AF65-F5344CB8AC3E}">
+        <p14:creationId xmlns:p14="http://schemas.microsoft.com/office/powerpoint/2010/main" val="1888932851"/>
+      </p:ext>
+    </p:extLst>
+  </p:cSld>
+  <p:clrMapOvr>
+    <a:masterClrMapping/>
+  </p:clrMapOvr>
+</p:sld>
+</file>
+
+<file path=ppt/slides/slide4.xml><?xml version="1.0" encoding="utf-8"?>
 <p:sld xmlns:a="http://schemas.openxmlformats.org/drawingml/2006/main" xmlns:r="http://schemas.openxmlformats.org/officeDocument/2006/relationships" xmlns:p="http://schemas.openxmlformats.org/presentationml/2006/main">
   <p:cSld>
     <p:spTree>
@@ -11504,7 +12567,7 @@
 </p:sld>
 </file>
 
-<file path=ppt/slides/slide4.xml><?xml version="1.0" encoding="utf-8"?>
+<file path=ppt/slides/slide5.xml><?xml version="1.0" encoding="utf-8"?>
 <p:sld xmlns:a="http://schemas.openxmlformats.org/drawingml/2006/main" xmlns:r="http://schemas.openxmlformats.org/officeDocument/2006/relationships" xmlns:p="http://schemas.openxmlformats.org/presentationml/2006/main">
   <p:cSld>
     <p:spTree>
@@ -11578,7 +12641,7 @@
         </p:blipFill>
         <p:spPr>
           <a:xfrm>
-            <a:off x="863755" y="1114424"/>
+            <a:off x="863755" y="1537753"/>
             <a:ext cx="10464489" cy="4629151"/>
           </a:xfrm>
           <a:prstGeom prst="rect">
@@ -11602,15 +12665,10 @@
             <p:ph type="title"/>
           </p:nvPr>
         </p:nvSpPr>
-        <p:spPr>
-          <a:xfrm>
-            <a:off x="838200" y="365126"/>
-            <a:ext cx="10515600" cy="950328"/>
-          </a:xfrm>
-        </p:spPr>
+        <p:spPr/>
         <p:txBody>
           <a:bodyPr>
-            <a:normAutofit fontScale="90000"/>
+            <a:normAutofit/>
           </a:bodyPr>
           <a:lstStyle/>
           <a:p>
@@ -11634,7 +12692,7 @@
 </p:sld>
 </file>
 
-<file path=ppt/slides/slide5.xml><?xml version="1.0" encoding="utf-8"?>
+<file path=ppt/slides/slide6.xml><?xml version="1.0" encoding="utf-8"?>
 <p:sld xmlns:a="http://schemas.openxmlformats.org/drawingml/2006/main" xmlns:r="http://schemas.openxmlformats.org/officeDocument/2006/relationships" xmlns:p="http://schemas.openxmlformats.org/presentationml/2006/main">
   <p:cSld>
     <p:spTree>
@@ -11759,7 +12817,7 @@
         <p:spPr>
           <a:xfrm>
             <a:off x="524933" y="5130801"/>
-            <a:ext cx="11142133" cy="954107"/>
+            <a:ext cx="11142133" cy="1384995"/>
           </a:xfrm>
           <a:prstGeom prst="rect">
             <a:avLst/>
@@ -11773,7 +12831,9 @@
           <a:lstStyle/>
           <a:p>
             <a:r>
-              <a:rPr lang="en-US" sz="2800" dirty="0"/>
+              <a:rPr lang="en-US" sz="2800" dirty="0">
+                <a:latin typeface="Bahnschrift" panose="020B0502040204020203" pitchFamily="34" charset="0"/>
+              </a:rPr>
               <a:t>We can see how an increase in radiative forcing has caused an increase in global mean temperatures and global mean sea-levels over the years.</a:t>
             </a:r>
           </a:p>
@@ -11792,7 +12852,7 @@
 </p:sld>
 </file>
 
-<file path=ppt/slides/slide6.xml><?xml version="1.0" encoding="utf-8"?>
+<file path=ppt/slides/slide7.xml><?xml version="1.0" encoding="utf-8"?>
 <p:sld xmlns:a="http://schemas.openxmlformats.org/drawingml/2006/main" xmlns:r="http://schemas.openxmlformats.org/officeDocument/2006/relationships" xmlns:p="http://schemas.openxmlformats.org/presentationml/2006/main">
   <p:cSld>
     <p:spTree>
@@ -11837,8 +12897,8 @@
           </a:p>
         </p:txBody>
       </p:sp>
-      <mc:AlternateContent xmlns:mc="http://schemas.openxmlformats.org/markup-compatibility/2006" xmlns:a14="http://schemas.microsoft.com/office/drawing/2010/main">
-        <mc:Choice Requires="a14">
+      <mc:AlternateContent xmlns:mc="http://schemas.openxmlformats.org/markup-compatibility/2006">
+        <mc:Choice xmlns:a14="http://schemas.microsoft.com/office/drawing/2010/main" Requires="a14">
           <p:sp>
             <p:nvSpPr>
               <p:cNvPr id="3" name="Content Placeholder 2">
@@ -11858,7 +12918,7 @@
             <p:spPr/>
             <p:txBody>
               <a:bodyPr>
-                <a:normAutofit lnSpcReduction="10000"/>
+                <a:normAutofit/>
               </a:bodyPr>
               <a:lstStyle/>
               <a:p>
@@ -11895,109 +12955,6 @@
                         <a:latin typeface="Cambria Math" panose="02040503050406030204" pitchFamily="18" charset="0"/>
                       </a:rPr>
                       <m:t>=</m:t>
-                    </m:r>
-                    <m:r>
-                      <a:rPr lang="en-US" b="0" i="1" smtClean="0">
-                        <a:latin typeface="Cambria Math" panose="02040503050406030204" pitchFamily="18" charset="0"/>
-                      </a:rPr>
-                      <m:t>𝛼</m:t>
-                    </m:r>
-                    <m:d>
-                      <m:dPr>
-                        <m:ctrlPr>
-                          <a:rPr lang="en-US" b="0" i="1" smtClean="0">
-                            <a:latin typeface="Cambria Math" panose="02040503050406030204" pitchFamily="18" charset="0"/>
-                          </a:rPr>
-                        </m:ctrlPr>
-                      </m:dPr>
-                      <m:e>
-                        <m:r>
-                          <a:rPr lang="en-US" b="0" i="1" smtClean="0">
-                            <a:latin typeface="Cambria Math" panose="02040503050406030204" pitchFamily="18" charset="0"/>
-                          </a:rPr>
-                          <m:t>𝑇</m:t>
-                        </m:r>
-                        <m:d>
-                          <m:dPr>
-                            <m:ctrlPr>
-                              <a:rPr lang="en-US" b="0" i="1" smtClean="0">
-                                <a:latin typeface="Cambria Math" panose="02040503050406030204" pitchFamily="18" charset="0"/>
-                              </a:rPr>
-                            </m:ctrlPr>
-                          </m:dPr>
-                          <m:e>
-                            <m:r>
-                              <a:rPr lang="en-US" b="0" i="1" smtClean="0">
-                                <a:latin typeface="Cambria Math" panose="02040503050406030204" pitchFamily="18" charset="0"/>
-                              </a:rPr>
-                              <m:t>𝑡</m:t>
-                            </m:r>
-                          </m:e>
-                        </m:d>
-                        <m:r>
-                          <a:rPr lang="en-US" b="0" i="1" smtClean="0">
-                            <a:latin typeface="Cambria Math" panose="02040503050406030204" pitchFamily="18" charset="0"/>
-                          </a:rPr>
-                          <m:t>−</m:t>
-                        </m:r>
-                        <m:sSub>
-                          <m:sSubPr>
-                            <m:ctrlPr>
-                              <a:rPr lang="en-US" b="0" i="1" smtClean="0">
-                                <a:latin typeface="Cambria Math" panose="02040503050406030204" pitchFamily="18" charset="0"/>
-                              </a:rPr>
-                            </m:ctrlPr>
-                          </m:sSubPr>
-                          <m:e>
-                            <m:r>
-                              <a:rPr lang="en-US" b="0" i="1" smtClean="0">
-                                <a:latin typeface="Cambria Math" panose="02040503050406030204" pitchFamily="18" charset="0"/>
-                              </a:rPr>
-                              <m:t>𝑇</m:t>
-                            </m:r>
-                          </m:e>
-                          <m:sub>
-                            <m:r>
-                              <a:rPr lang="en-US" b="0" i="1" smtClean="0">
-                                <a:latin typeface="Cambria Math" panose="02040503050406030204" pitchFamily="18" charset="0"/>
-                              </a:rPr>
-                              <m:t>𝑒𝑞</m:t>
-                            </m:r>
-                          </m:sub>
-                        </m:sSub>
-                      </m:e>
-                    </m:d>
-                  </m:oMath>
-                </a14:m>
-                <a:endParaRPr lang="en-US" b="0" dirty="0"/>
-              </a:p>
-              <a:p>
-                <a:pPr lvl="1"/>
-                <a14:m>
-                  <m:oMath xmlns:m="http://schemas.openxmlformats.org/officeDocument/2006/math">
-                    <m:r>
-                      <a:rPr lang="en-US" b="0" i="1" smtClean="0">
-                        <a:latin typeface="Cambria Math" panose="02040503050406030204" pitchFamily="18" charset="0"/>
-                      </a:rPr>
-                      <m:t>𝑑𝑆</m:t>
-                    </m:r>
-                    <m:r>
-                      <a:rPr lang="en-US" b="0" i="1" smtClean="0">
-                        <a:latin typeface="Cambria Math" panose="02040503050406030204" pitchFamily="18" charset="0"/>
-                      </a:rPr>
-                      <m:t>=</m:t>
-                    </m:r>
-                    <m:r>
-                      <a:rPr lang="en-US" b="0" i="1" smtClean="0">
-                        <a:latin typeface="Cambria Math" panose="02040503050406030204" pitchFamily="18" charset="0"/>
-                      </a:rPr>
-                      <m:t>𝑑𝑡</m:t>
-                    </m:r>
-                    <m:r>
-                      <a:rPr lang="en-US" b="0" i="1" smtClean="0">
-                        <a:latin typeface="Cambria Math" panose="02040503050406030204" pitchFamily="18" charset="0"/>
-                      </a:rPr>
-                      <m:t>×</m:t>
                     </m:r>
                     <m:r>
                       <a:rPr lang="en-US" b="0" i="1" smtClean="0">
@@ -12418,506 +13375,6 @@
               </a:p>
               <a:p>
                 <a:pPr lvl="1"/>
-                <a:r>
-                  <a:rPr lang="en-US" b="0" dirty="0"/>
-                  <a:t>Start Model</a:t>
-                </a:r>
-              </a:p>
-              <a:p>
-                <a:pPr lvl="1"/>
-                <a14:m>
-                  <m:oMath xmlns:m="http://schemas.openxmlformats.org/officeDocument/2006/math">
-                    <m:sSub>
-                      <m:sSubPr>
-                        <m:ctrlPr>
-                          <a:rPr lang="en-US" b="0" i="1" smtClean="0">
-                            <a:latin typeface="Cambria Math" panose="02040503050406030204" pitchFamily="18" charset="0"/>
-                          </a:rPr>
-                        </m:ctrlPr>
-                      </m:sSubPr>
-                      <m:e>
-                        <m:r>
-                          <a:rPr lang="en-US" b="0" i="1" smtClean="0">
-                            <a:latin typeface="Cambria Math" panose="02040503050406030204" pitchFamily="18" charset="0"/>
-                          </a:rPr>
-                          <m:t>𝑑</m:t>
-                        </m:r>
-                      </m:e>
-                      <m:sub>
-                        <m:r>
-                          <a:rPr lang="en-US" b="0" i="1" smtClean="0">
-                            <a:latin typeface="Cambria Math" panose="02040503050406030204" pitchFamily="18" charset="0"/>
-                          </a:rPr>
-                          <m:t>0</m:t>
-                        </m:r>
-                      </m:sub>
-                    </m:sSub>
-                    <m:r>
-                      <a:rPr lang="en-US" b="0" i="1" smtClean="0">
-                        <a:latin typeface="Cambria Math" panose="02040503050406030204" pitchFamily="18" charset="0"/>
-                      </a:rPr>
-                      <m:t>←</m:t>
-                    </m:r>
-                    <m:sSub>
-                      <m:sSubPr>
-                        <m:ctrlPr>
-                          <a:rPr lang="en-US" b="0" i="1" smtClean="0">
-                            <a:latin typeface="Cambria Math" panose="02040503050406030204" pitchFamily="18" charset="0"/>
-                          </a:rPr>
-                        </m:ctrlPr>
-                      </m:sSubPr>
-                      <m:e>
-                        <m:r>
-                          <a:rPr lang="en-US" b="0" i="1" smtClean="0">
-                            <a:latin typeface="Cambria Math" panose="02040503050406030204" pitchFamily="18" charset="0"/>
-                          </a:rPr>
-                          <m:t>𝑆</m:t>
-                        </m:r>
-                      </m:e>
-                      <m:sub>
-                        <m:r>
-                          <a:rPr lang="en-US" b="0" i="1" smtClean="0">
-                            <a:latin typeface="Cambria Math" panose="02040503050406030204" pitchFamily="18" charset="0"/>
-                          </a:rPr>
-                          <m:t>0</m:t>
-                        </m:r>
-                      </m:sub>
-                    </m:sSub>
-                    <m:r>
-                      <a:rPr lang="en-US" b="0" i="1" smtClean="0">
-                        <a:latin typeface="Cambria Math" panose="02040503050406030204" pitchFamily="18" charset="0"/>
-                      </a:rPr>
-                      <m:t> </m:t>
-                    </m:r>
-                    <m:r>
-                      <a:rPr lang="en-US" b="0" i="1" smtClean="0">
-                        <a:latin typeface="Cambria Math" panose="02040503050406030204" pitchFamily="18" charset="0"/>
-                      </a:rPr>
-                      <m:t>𝑎𝑠𝑠𝑢𝑚𝑒</m:t>
-                    </m:r>
-                    <m:d>
-                      <m:dPr>
-                        <m:ctrlPr>
-                          <a:rPr lang="en-US" b="0" i="1" smtClean="0">
-                            <a:latin typeface="Cambria Math" panose="02040503050406030204" pitchFamily="18" charset="0"/>
-                          </a:rPr>
-                        </m:ctrlPr>
-                      </m:dPr>
-                      <m:e>
-                        <m:r>
-                          <a:rPr lang="en-US" b="0" i="1" smtClean="0">
-                            <a:latin typeface="Cambria Math" panose="02040503050406030204" pitchFamily="18" charset="0"/>
-                          </a:rPr>
-                          <m:t>𝛼</m:t>
-                        </m:r>
-                        <m:r>
-                          <a:rPr lang="en-US" b="0" i="1" smtClean="0">
-                            <a:latin typeface="Cambria Math" panose="02040503050406030204" pitchFamily="18" charset="0"/>
-                          </a:rPr>
-                          <m:t>,</m:t>
-                        </m:r>
-                        <m:sSub>
-                          <m:sSubPr>
-                            <m:ctrlPr>
-                              <a:rPr lang="en-US" b="0" i="1" smtClean="0">
-                                <a:latin typeface="Cambria Math" panose="02040503050406030204" pitchFamily="18" charset="0"/>
-                              </a:rPr>
-                            </m:ctrlPr>
-                          </m:sSubPr>
-                          <m:e>
-                            <m:r>
-                              <a:rPr lang="en-US" b="0" i="1" smtClean="0">
-                                <a:latin typeface="Cambria Math" panose="02040503050406030204" pitchFamily="18" charset="0"/>
-                              </a:rPr>
-                              <m:t>𝑇</m:t>
-                            </m:r>
-                          </m:e>
-                          <m:sub>
-                            <m:r>
-                              <a:rPr lang="en-US" b="0" i="1" smtClean="0">
-                                <a:latin typeface="Cambria Math" panose="02040503050406030204" pitchFamily="18" charset="0"/>
-                              </a:rPr>
-                              <m:t>𝑒𝑞</m:t>
-                            </m:r>
-                          </m:sub>
-                        </m:sSub>
-                      </m:e>
-                    </m:d>
-                  </m:oMath>
-                </a14:m>
-                <a:endParaRPr lang="en-US" b="0" dirty="0"/>
-              </a:p>
-              <a:p>
-                <a:pPr lvl="1"/>
-                <a14:m>
-                  <m:oMath xmlns:m="http://schemas.openxmlformats.org/officeDocument/2006/math">
-                    <m:sSub>
-                      <m:sSubPr>
-                        <m:ctrlPr>
-                          <a:rPr lang="en-US" b="0" i="1" smtClean="0">
-                            <a:latin typeface="Cambria Math" panose="02040503050406030204" pitchFamily="18" charset="0"/>
-                          </a:rPr>
-                        </m:ctrlPr>
-                      </m:sSubPr>
-                      <m:e>
-                        <m:r>
-                          <a:rPr lang="en-US" b="0" i="1" smtClean="0">
-                            <a:latin typeface="Cambria Math" panose="02040503050406030204" pitchFamily="18" charset="0"/>
-                          </a:rPr>
-                          <m:t>𝑑</m:t>
-                        </m:r>
-                      </m:e>
-                      <m:sub>
-                        <m:r>
-                          <a:rPr lang="en-US" b="0" i="1" smtClean="0">
-                            <a:latin typeface="Cambria Math" panose="02040503050406030204" pitchFamily="18" charset="0"/>
-                          </a:rPr>
-                          <m:t>1</m:t>
-                        </m:r>
-                      </m:sub>
-                    </m:sSub>
-                    <m:r>
-                      <a:rPr lang="en-US" b="0" i="1" smtClean="0">
-                        <a:latin typeface="Cambria Math" panose="02040503050406030204" pitchFamily="18" charset="0"/>
-                      </a:rPr>
-                      <m:t>←</m:t>
-                    </m:r>
-                    <m:sSub>
-                      <m:sSubPr>
-                        <m:ctrlPr>
-                          <a:rPr lang="en-US" b="0" i="1" smtClean="0">
-                            <a:latin typeface="Cambria Math" panose="02040503050406030204" pitchFamily="18" charset="0"/>
-                          </a:rPr>
-                        </m:ctrlPr>
-                      </m:sSubPr>
-                      <m:e>
-                        <m:r>
-                          <a:rPr lang="en-US" b="0" i="1" smtClean="0">
-                            <a:latin typeface="Cambria Math" panose="02040503050406030204" pitchFamily="18" charset="0"/>
-                          </a:rPr>
-                          <m:t>𝑆</m:t>
-                        </m:r>
-                      </m:e>
-                      <m:sub>
-                        <m:r>
-                          <a:rPr lang="en-US" b="0" i="1" smtClean="0">
-                            <a:latin typeface="Cambria Math" panose="02040503050406030204" pitchFamily="18" charset="0"/>
-                          </a:rPr>
-                          <m:t>1</m:t>
-                        </m:r>
-                      </m:sub>
-                    </m:sSub>
-                    <m:r>
-                      <a:rPr lang="en-US" b="0" i="1" smtClean="0">
-                        <a:latin typeface="Cambria Math" panose="02040503050406030204" pitchFamily="18" charset="0"/>
-                      </a:rPr>
-                      <m:t>=</m:t>
-                    </m:r>
-                    <m:sSub>
-                      <m:sSubPr>
-                        <m:ctrlPr>
-                          <a:rPr lang="en-US" b="0" i="1" smtClean="0">
-                            <a:latin typeface="Cambria Math" panose="02040503050406030204" pitchFamily="18" charset="0"/>
-                          </a:rPr>
-                        </m:ctrlPr>
-                      </m:sSubPr>
-                      <m:e>
-                        <m:r>
-                          <a:rPr lang="en-US" b="0" i="1" smtClean="0">
-                            <a:latin typeface="Cambria Math" panose="02040503050406030204" pitchFamily="18" charset="0"/>
-                          </a:rPr>
-                          <m:t>𝑆</m:t>
-                        </m:r>
-                      </m:e>
-                      <m:sub>
-                        <m:r>
-                          <a:rPr lang="en-US" b="0" i="1" smtClean="0">
-                            <a:latin typeface="Cambria Math" panose="02040503050406030204" pitchFamily="18" charset="0"/>
-                          </a:rPr>
-                          <m:t>0</m:t>
-                        </m:r>
-                      </m:sub>
-                    </m:sSub>
-                    <m:r>
-                      <a:rPr lang="en-US" b="0" i="1" smtClean="0">
-                        <a:latin typeface="Cambria Math" panose="02040503050406030204" pitchFamily="18" charset="0"/>
-                      </a:rPr>
-                      <m:t>+</m:t>
-                    </m:r>
-                    <m:r>
-                      <m:rPr>
-                        <m:sty m:val="p"/>
-                      </m:rPr>
-                      <a:rPr lang="en-US" b="0" i="0" smtClean="0">
-                        <a:latin typeface="Cambria Math" panose="02040503050406030204" pitchFamily="18" charset="0"/>
-                      </a:rPr>
-                      <m:t>Δ</m:t>
-                    </m:r>
-                    <m:r>
-                      <a:rPr lang="en-US" b="0" i="1" smtClean="0">
-                        <a:latin typeface="Cambria Math" panose="02040503050406030204" pitchFamily="18" charset="0"/>
-                      </a:rPr>
-                      <m:t>𝑡</m:t>
-                    </m:r>
-                    <m:r>
-                      <a:rPr lang="en-US" b="0" i="1" smtClean="0">
-                        <a:latin typeface="Cambria Math" panose="02040503050406030204" pitchFamily="18" charset="0"/>
-                      </a:rPr>
-                      <m:t>×</m:t>
-                    </m:r>
-                    <m:r>
-                      <a:rPr lang="en-US" b="0" i="1" smtClean="0">
-                        <a:latin typeface="Cambria Math" panose="02040503050406030204" pitchFamily="18" charset="0"/>
-                      </a:rPr>
-                      <m:t>𝛼</m:t>
-                    </m:r>
-                    <m:r>
-                      <a:rPr lang="en-US" b="0" i="1" smtClean="0">
-                        <a:latin typeface="Cambria Math" panose="02040503050406030204" pitchFamily="18" charset="0"/>
-                      </a:rPr>
-                      <m:t>×</m:t>
-                    </m:r>
-                    <m:d>
-                      <m:dPr>
-                        <m:ctrlPr>
-                          <a:rPr lang="en-US" b="0" i="1" smtClean="0">
-                            <a:latin typeface="Cambria Math" panose="02040503050406030204" pitchFamily="18" charset="0"/>
-                          </a:rPr>
-                        </m:ctrlPr>
-                      </m:dPr>
-                      <m:e>
-                        <m:sSub>
-                          <m:sSubPr>
-                            <m:ctrlPr>
-                              <a:rPr lang="en-US" b="0" i="1" smtClean="0">
-                                <a:latin typeface="Cambria Math" panose="02040503050406030204" pitchFamily="18" charset="0"/>
-                              </a:rPr>
-                            </m:ctrlPr>
-                          </m:sSubPr>
-                          <m:e>
-                            <m:r>
-                              <a:rPr lang="en-US" b="0" i="1" smtClean="0">
-                                <a:latin typeface="Cambria Math" panose="02040503050406030204" pitchFamily="18" charset="0"/>
-                              </a:rPr>
-                              <m:t>𝑇</m:t>
-                            </m:r>
-                          </m:e>
-                          <m:sub>
-                            <m:r>
-                              <a:rPr lang="en-US" b="0" i="1" smtClean="0">
-                                <a:latin typeface="Cambria Math" panose="02040503050406030204" pitchFamily="18" charset="0"/>
-                              </a:rPr>
-                              <m:t>0</m:t>
-                            </m:r>
-                          </m:sub>
-                        </m:sSub>
-                        <m:r>
-                          <a:rPr lang="en-US" b="0" i="1" smtClean="0">
-                            <a:latin typeface="Cambria Math" panose="02040503050406030204" pitchFamily="18" charset="0"/>
-                          </a:rPr>
-                          <m:t>−</m:t>
-                        </m:r>
-                        <m:sSub>
-                          <m:sSubPr>
-                            <m:ctrlPr>
-                              <a:rPr lang="en-US" b="0" i="1" smtClean="0">
-                                <a:latin typeface="Cambria Math" panose="02040503050406030204" pitchFamily="18" charset="0"/>
-                              </a:rPr>
-                            </m:ctrlPr>
-                          </m:sSubPr>
-                          <m:e>
-                            <m:r>
-                              <a:rPr lang="en-US" b="0" i="1" smtClean="0">
-                                <a:latin typeface="Cambria Math" panose="02040503050406030204" pitchFamily="18" charset="0"/>
-                              </a:rPr>
-                              <m:t>𝑇</m:t>
-                            </m:r>
-                          </m:e>
-                          <m:sub>
-                            <m:r>
-                              <a:rPr lang="en-US" b="0" i="1" smtClean="0">
-                                <a:latin typeface="Cambria Math" panose="02040503050406030204" pitchFamily="18" charset="0"/>
-                              </a:rPr>
-                              <m:t>𝑒𝑞</m:t>
-                            </m:r>
-                          </m:sub>
-                        </m:sSub>
-                      </m:e>
-                    </m:d>
-                  </m:oMath>
-                </a14:m>
-                <a:endParaRPr lang="en-US" b="0" dirty="0"/>
-              </a:p>
-              <a:p>
-                <a:pPr lvl="1"/>
-                <a14:m>
-                  <m:oMath xmlns:m="http://schemas.openxmlformats.org/officeDocument/2006/math">
-                    <m:sSub>
-                      <m:sSubPr>
-                        <m:ctrlPr>
-                          <a:rPr lang="en-US" b="0" i="1" smtClean="0">
-                            <a:latin typeface="Cambria Math" panose="02040503050406030204" pitchFamily="18" charset="0"/>
-                          </a:rPr>
-                        </m:ctrlPr>
-                      </m:sSubPr>
-                      <m:e>
-                        <m:r>
-                          <a:rPr lang="en-US" b="0" i="1" smtClean="0">
-                            <a:latin typeface="Cambria Math" panose="02040503050406030204" pitchFamily="18" charset="0"/>
-                          </a:rPr>
-                          <m:t>𝑑</m:t>
-                        </m:r>
-                      </m:e>
-                      <m:sub>
-                        <m:r>
-                          <a:rPr lang="en-US" b="0" i="1" smtClean="0">
-                            <a:latin typeface="Cambria Math" panose="02040503050406030204" pitchFamily="18" charset="0"/>
-                          </a:rPr>
-                          <m:t>2</m:t>
-                        </m:r>
-                      </m:sub>
-                    </m:sSub>
-                    <m:r>
-                      <a:rPr lang="en-US" b="0" i="1" smtClean="0">
-                        <a:latin typeface="Cambria Math" panose="02040503050406030204" pitchFamily="18" charset="0"/>
-                      </a:rPr>
-                      <m:t>←</m:t>
-                    </m:r>
-                    <m:sSub>
-                      <m:sSubPr>
-                        <m:ctrlPr>
-                          <a:rPr lang="en-US" b="0" i="1" smtClean="0">
-                            <a:latin typeface="Cambria Math" panose="02040503050406030204" pitchFamily="18" charset="0"/>
-                          </a:rPr>
-                        </m:ctrlPr>
-                      </m:sSubPr>
-                      <m:e>
-                        <m:r>
-                          <a:rPr lang="en-US" b="0" i="1" smtClean="0">
-                            <a:latin typeface="Cambria Math" panose="02040503050406030204" pitchFamily="18" charset="0"/>
-                          </a:rPr>
-                          <m:t>𝑆</m:t>
-                        </m:r>
-                      </m:e>
-                      <m:sub>
-                        <m:r>
-                          <a:rPr lang="en-US" b="0" i="1" smtClean="0">
-                            <a:latin typeface="Cambria Math" panose="02040503050406030204" pitchFamily="18" charset="0"/>
-                          </a:rPr>
-                          <m:t>2</m:t>
-                        </m:r>
-                      </m:sub>
-                    </m:sSub>
-                    <m:r>
-                      <a:rPr lang="en-US" b="0" i="1" smtClean="0">
-                        <a:latin typeface="Cambria Math" panose="02040503050406030204" pitchFamily="18" charset="0"/>
-                      </a:rPr>
-                      <m:t>=</m:t>
-                    </m:r>
-                    <m:sSub>
-                      <m:sSubPr>
-                        <m:ctrlPr>
-                          <a:rPr lang="en-US" b="0" i="1" smtClean="0">
-                            <a:latin typeface="Cambria Math" panose="02040503050406030204" pitchFamily="18" charset="0"/>
-                          </a:rPr>
-                        </m:ctrlPr>
-                      </m:sSubPr>
-                      <m:e>
-                        <m:r>
-                          <a:rPr lang="en-US" b="0" i="1" smtClean="0">
-                            <a:latin typeface="Cambria Math" panose="02040503050406030204" pitchFamily="18" charset="0"/>
-                          </a:rPr>
-                          <m:t>𝑆</m:t>
-                        </m:r>
-                      </m:e>
-                      <m:sub>
-                        <m:r>
-                          <a:rPr lang="en-US" b="0" i="1" smtClean="0">
-                            <a:latin typeface="Cambria Math" panose="02040503050406030204" pitchFamily="18" charset="0"/>
-                          </a:rPr>
-                          <m:t>1</m:t>
-                        </m:r>
-                      </m:sub>
-                    </m:sSub>
-                    <m:r>
-                      <a:rPr lang="en-US" b="0" i="1" smtClean="0">
-                        <a:latin typeface="Cambria Math" panose="02040503050406030204" pitchFamily="18" charset="0"/>
-                      </a:rPr>
-                      <m:t>+…</m:t>
-                    </m:r>
-                    <m:d>
-                      <m:dPr>
-                        <m:ctrlPr>
-                          <a:rPr lang="en-US" b="0" i="1" smtClean="0">
-                            <a:latin typeface="Cambria Math" panose="02040503050406030204" pitchFamily="18" charset="0"/>
-                          </a:rPr>
-                        </m:ctrlPr>
-                      </m:dPr>
-                      <m:e>
-                        <m:sSub>
-                          <m:sSubPr>
-                            <m:ctrlPr>
-                              <a:rPr lang="en-US" b="0" i="1" smtClean="0">
-                                <a:latin typeface="Cambria Math" panose="02040503050406030204" pitchFamily="18" charset="0"/>
-                              </a:rPr>
-                            </m:ctrlPr>
-                          </m:sSubPr>
-                          <m:e>
-                            <m:r>
-                              <a:rPr lang="en-US" b="0" i="1" smtClean="0">
-                                <a:latin typeface="Cambria Math" panose="02040503050406030204" pitchFamily="18" charset="0"/>
-                              </a:rPr>
-                              <m:t>𝑇</m:t>
-                            </m:r>
-                          </m:e>
-                          <m:sub>
-                            <m:r>
-                              <a:rPr lang="en-US" b="0" i="1" smtClean="0">
-                                <a:latin typeface="Cambria Math" panose="02040503050406030204" pitchFamily="18" charset="0"/>
-                              </a:rPr>
-                              <m:t>1</m:t>
-                            </m:r>
-                          </m:sub>
-                        </m:sSub>
-                        <m:r>
-                          <a:rPr lang="en-US" b="0" i="1" smtClean="0">
-                            <a:latin typeface="Cambria Math" panose="02040503050406030204" pitchFamily="18" charset="0"/>
-                          </a:rPr>
-                          <m:t>−</m:t>
-                        </m:r>
-                        <m:sSub>
-                          <m:sSubPr>
-                            <m:ctrlPr>
-                              <a:rPr lang="en-US" b="0" i="1" smtClean="0">
-                                <a:latin typeface="Cambria Math" panose="02040503050406030204" pitchFamily="18" charset="0"/>
-                              </a:rPr>
-                            </m:ctrlPr>
-                          </m:sSubPr>
-                          <m:e>
-                            <m:r>
-                              <a:rPr lang="en-US" b="0" i="1" smtClean="0">
-                                <a:latin typeface="Cambria Math" panose="02040503050406030204" pitchFamily="18" charset="0"/>
-                              </a:rPr>
-                              <m:t>𝑇</m:t>
-                            </m:r>
-                          </m:e>
-                          <m:sub>
-                            <m:r>
-                              <a:rPr lang="en-US" b="0" i="1" smtClean="0">
-                                <a:latin typeface="Cambria Math" panose="02040503050406030204" pitchFamily="18" charset="0"/>
-                              </a:rPr>
-                              <m:t>𝑒𝑞</m:t>
-                            </m:r>
-                          </m:sub>
-                        </m:sSub>
-                      </m:e>
-                    </m:d>
-                  </m:oMath>
-                </a14:m>
-                <a:endParaRPr lang="en-US" b="0" dirty="0"/>
-              </a:p>
-              <a:p>
-                <a:pPr lvl="1"/>
                 <a14:m>
                   <m:oMath xmlns:m="http://schemas.openxmlformats.org/officeDocument/2006/math">
                     <m:sSub>
@@ -13123,20 +13580,16 @@
                 </a14:m>
                 <a:endParaRPr lang="en-US" b="0" dirty="0"/>
               </a:p>
-              <a:p>
-                <a:pPr lvl="1"/>
-                <a:endParaRPr lang="en-US" b="0" dirty="0"/>
-              </a:p>
             </p:txBody>
           </p:sp>
         </mc:Choice>
-        <mc:Fallback xmlns="">
+        <mc:Fallback>
           <p:sp>
             <p:nvSpPr>
               <p:cNvPr id="3" name="Content Placeholder 2">
                 <a:extLst>
                   <a:ext uri="{FF2B5EF4-FFF2-40B4-BE49-F238E27FC236}">
-                    <a16:creationId xmlns:a16="http://schemas.microsoft.com/office/drawing/2014/main" xmlns:a14="http://schemas.microsoft.com/office/drawing/2010/main" xmlns="" id="{38720C92-7700-40CA-979E-55B1448F2966}"/>
+                    <a16:creationId xmlns:a16="http://schemas.microsoft.com/office/drawing/2014/main" id="{38720C92-7700-40CA-979E-55B1448F2966}"/>
                   </a:ext>
                 </a:extLst>
               </p:cNvPr>
@@ -13148,7 +13601,7 @@
               </p:nvPr>
             </p:nvSpPr>
             <p:spPr>
-              <a:blipFill rotWithShape="0">
+              <a:blipFill>
                 <a:blip r:embed="rId3"/>
                 <a:stretch>
                   <a:fillRect/>
@@ -13186,7 +13639,7 @@
             </p:nvSpPr>
             <p:spPr>
               <a:xfrm>
-                <a:off x="5858934" y="1315454"/>
+                <a:off x="1418647" y="3974943"/>
                 <a:ext cx="6281335" cy="1849096"/>
               </a:xfrm>
               <a:prstGeom prst="rect">
@@ -13325,7 +13778,7 @@
             </p:nvSpPr>
             <p:spPr>
               <a:xfrm>
-                <a:off x="5858934" y="1315454"/>
+                <a:off x="1418647" y="3974943"/>
                 <a:ext cx="6281335" cy="1849096"/>
               </a:xfrm>
               <a:prstGeom prst="rect">
@@ -13334,7 +13787,7 @@
               <a:blipFill>
                 <a:blip r:embed="rId4"/>
                 <a:stretch>
-                  <a:fillRect t="-3300" r="-970" b="-6931"/>
+                  <a:fillRect t="-2970" r="-971" b="-6931"/>
                 </a:stretch>
               </a:blipFill>
             </p:spPr>
@@ -13404,7 +13857,7 @@
 </p:sld>
 </file>
 
-<file path=ppt/slides/slide7.xml><?xml version="1.0" encoding="utf-8"?>
+<file path=ppt/slides/slide8.xml><?xml version="1.0" encoding="utf-8"?>
 <p:sld xmlns:a="http://schemas.openxmlformats.org/drawingml/2006/main" xmlns:r="http://schemas.openxmlformats.org/officeDocument/2006/relationships" xmlns:p="http://schemas.openxmlformats.org/presentationml/2006/main">
   <p:cSld>
     <p:spTree>
@@ -13515,7 +13968,7 @@
 </p:sld>
 </file>
 
-<file path=ppt/slides/slide8.xml><?xml version="1.0" encoding="utf-8"?>
+<file path=ppt/slides/slide9.xml><?xml version="1.0" encoding="utf-8"?>
 <p:sld xmlns:a="http://schemas.openxmlformats.org/drawingml/2006/main" xmlns:r="http://schemas.openxmlformats.org/officeDocument/2006/relationships" xmlns:p="http://schemas.openxmlformats.org/presentationml/2006/main">
   <p:cSld>
     <p:spTree>
@@ -13655,211 +14108,17 @@
           <a:p>
             <a:r>
               <a:rPr lang="en-US" dirty="0"/>
-              <a:t>Likelihood function - </a:t>
-            </a:r>
-          </a:p>
-        </p:txBody>
-      </p:sp>
-    </p:spTree>
-    <p:extLst>
-      <p:ext uri="{BB962C8B-B14F-4D97-AF65-F5344CB8AC3E}">
-        <p14:creationId xmlns:p14="http://schemas.microsoft.com/office/powerpoint/2010/main" val="1880209011"/>
-      </p:ext>
-    </p:extLst>
-  </p:cSld>
-  <p:clrMapOvr>
-    <a:masterClrMapping/>
-  </p:clrMapOvr>
-</p:sld>
-</file>
-
-<file path=ppt/slides/slide9.xml><?xml version="1.0" encoding="utf-8"?>
-<p:sld xmlns:a="http://schemas.openxmlformats.org/drawingml/2006/main" xmlns:r="http://schemas.openxmlformats.org/officeDocument/2006/relationships" xmlns:p="http://schemas.openxmlformats.org/presentationml/2006/main">
-  <p:cSld>
-    <p:spTree>
-      <p:nvGrpSpPr>
-        <p:cNvPr id="1" name=""/>
-        <p:cNvGrpSpPr/>
-        <p:nvPr/>
-      </p:nvGrpSpPr>
-      <p:grpSpPr>
-        <a:xfrm>
-          <a:off x="0" y="0"/>
-          <a:ext cx="0" cy="0"/>
-          <a:chOff x="0" y="0"/>
-          <a:chExt cx="0" cy="0"/>
-        </a:xfrm>
-      </p:grpSpPr>
-      <p:sp>
-        <p:nvSpPr>
-          <p:cNvPr id="2" name="Title 1">
-            <a:extLst>
-              <a:ext uri="{FF2B5EF4-FFF2-40B4-BE49-F238E27FC236}">
-                <a16:creationId xmlns:a16="http://schemas.microsoft.com/office/drawing/2014/main" id="{686C4237-8385-439A-86D4-DF3515A0EB4D}"/>
-              </a:ext>
-            </a:extLst>
-          </p:cNvPr>
-          <p:cNvSpPr>
-            <a:spLocks noGrp="1"/>
-          </p:cNvSpPr>
-          <p:nvPr>
-            <p:ph type="title"/>
-          </p:nvPr>
-        </p:nvSpPr>
-        <p:spPr/>
-        <p:txBody>
-          <a:bodyPr/>
-          <a:lstStyle/>
-          <a:p>
-            <a:r>
-              <a:rPr lang="en-US" dirty="0"/>
-              <a:t>History Plots</a:t>
-            </a:r>
-          </a:p>
-        </p:txBody>
-      </p:sp>
-      <p:sp>
-        <p:nvSpPr>
-          <p:cNvPr id="15" name="TextBox 14">
-            <a:extLst>
-              <a:ext uri="{FF2B5EF4-FFF2-40B4-BE49-F238E27FC236}">
-                <a16:creationId xmlns:a16="http://schemas.microsoft.com/office/drawing/2014/main" id="{CCA3BB48-7BDD-4640-B7B1-9D4A2599EA96}"/>
-              </a:ext>
-            </a:extLst>
-          </p:cNvPr>
-          <p:cNvSpPr txBox="1"/>
-          <p:nvPr/>
-        </p:nvSpPr>
-        <p:spPr>
-          <a:xfrm>
-            <a:off x="1609930" y="4899012"/>
-            <a:ext cx="1024639" cy="523220"/>
-          </a:xfrm>
-          <a:prstGeom prst="rect">
-            <a:avLst/>
-          </a:prstGeom>
-          <a:noFill/>
-        </p:spPr>
-        <p:txBody>
-          <a:bodyPr wrap="none" rtlCol="0">
-            <a:spAutoFit/>
-          </a:bodyPr>
-          <a:lstStyle/>
-          <a:p>
-            <a:r>
-              <a:rPr lang="en-US" sz="2800" dirty="0"/>
-              <a:t>Alpha</a:t>
-            </a:r>
-          </a:p>
-        </p:txBody>
-      </p:sp>
-      <p:sp>
-        <p:nvSpPr>
-          <p:cNvPr id="16" name="TextBox 15">
-            <a:extLst>
-              <a:ext uri="{FF2B5EF4-FFF2-40B4-BE49-F238E27FC236}">
-                <a16:creationId xmlns:a16="http://schemas.microsoft.com/office/drawing/2014/main" id="{DFEC1B2A-71D6-4AAC-8706-45D107249D4C}"/>
-              </a:ext>
-            </a:extLst>
-          </p:cNvPr>
-          <p:cNvSpPr txBox="1"/>
-          <p:nvPr/>
-        </p:nvSpPr>
-        <p:spPr>
-          <a:xfrm>
-            <a:off x="5748725" y="4899012"/>
-            <a:ext cx="694549" cy="523220"/>
-          </a:xfrm>
-          <a:prstGeom prst="rect">
-            <a:avLst/>
-          </a:prstGeom>
-          <a:noFill/>
-        </p:spPr>
-        <p:txBody>
-          <a:bodyPr wrap="none" rtlCol="0">
-            <a:spAutoFit/>
-          </a:bodyPr>
-          <a:lstStyle/>
-          <a:p>
-            <a:r>
-              <a:rPr lang="en-US" sz="2800" dirty="0" err="1"/>
-              <a:t>Teq</a:t>
-            </a:r>
-            <a:endParaRPr lang="en-US" sz="2800" dirty="0"/>
-          </a:p>
-        </p:txBody>
-      </p:sp>
-      <p:sp>
-        <p:nvSpPr>
-          <p:cNvPr id="17" name="TextBox 16">
-            <a:extLst>
-              <a:ext uri="{FF2B5EF4-FFF2-40B4-BE49-F238E27FC236}">
-                <a16:creationId xmlns:a16="http://schemas.microsoft.com/office/drawing/2014/main" id="{4605670E-3745-4450-86CE-AF4751EB3C38}"/>
-              </a:ext>
-            </a:extLst>
-          </p:cNvPr>
-          <p:cNvSpPr txBox="1"/>
-          <p:nvPr/>
-        </p:nvSpPr>
-        <p:spPr>
-          <a:xfrm>
-            <a:off x="9592543" y="4899012"/>
-            <a:ext cx="758541" cy="523220"/>
-          </a:xfrm>
-          <a:prstGeom prst="rect">
-            <a:avLst/>
-          </a:prstGeom>
-          <a:noFill/>
-        </p:spPr>
-        <p:txBody>
-          <a:bodyPr wrap="none" rtlCol="0">
-            <a:spAutoFit/>
-          </a:bodyPr>
-          <a:lstStyle/>
-          <a:p>
-            <a:r>
-              <a:rPr lang="en-US" sz="2800" dirty="0"/>
-              <a:t>Rho</a:t>
+              <a:t>Log-Likelihood function - </a:t>
             </a:r>
           </a:p>
         </p:txBody>
       </p:sp>
       <p:pic>
         <p:nvPicPr>
-          <p:cNvPr id="18" name="Picture 17">
+          <p:cNvPr id="6" name="Picture 5">
             <a:extLst>
               <a:ext uri="{FF2B5EF4-FFF2-40B4-BE49-F238E27FC236}">
-                <a16:creationId xmlns:a16="http://schemas.microsoft.com/office/drawing/2014/main" id="{82714EE7-4ED6-4125-8573-761F58ED4771}"/>
-              </a:ext>
-            </a:extLst>
-          </p:cNvPr>
-          <p:cNvPicPr>
-            <a:picLocks noChangeAspect="1"/>
-          </p:cNvPicPr>
-          <p:nvPr/>
-        </p:nvPicPr>
-        <p:blipFill>
-          <a:blip r:embed="rId2"/>
-          <a:stretch>
-            <a:fillRect/>
-          </a:stretch>
-        </p:blipFill>
-        <p:spPr>
-          <a:xfrm>
-            <a:off x="250532" y="1958988"/>
-            <a:ext cx="3743433" cy="2607740"/>
-          </a:xfrm>
-          <a:prstGeom prst="rect">
-            <a:avLst/>
-          </a:prstGeom>
-        </p:spPr>
-      </p:pic>
-      <p:pic>
-        <p:nvPicPr>
-          <p:cNvPr id="19" name="Picture 18">
-            <a:extLst>
-              <a:ext uri="{FF2B5EF4-FFF2-40B4-BE49-F238E27FC236}">
-                <a16:creationId xmlns:a16="http://schemas.microsoft.com/office/drawing/2014/main" id="{B2104F80-1D62-472E-9EF1-AA2529BC8F10}"/>
+                <a16:creationId xmlns:a16="http://schemas.microsoft.com/office/drawing/2014/main" id="{D7E556E6-B722-4995-B48A-ED5CF03EC91B}"/>
               </a:ext>
             </a:extLst>
           </p:cNvPr>
@@ -13876,38 +14135,8 @@
         </p:blipFill>
         <p:spPr>
           <a:xfrm>
-            <a:off x="4147304" y="1958988"/>
-            <a:ext cx="3901718" cy="2607740"/>
-          </a:xfrm>
-          <a:prstGeom prst="rect">
-            <a:avLst/>
-          </a:prstGeom>
-        </p:spPr>
-      </p:pic>
-      <p:pic>
-        <p:nvPicPr>
-          <p:cNvPr id="20" name="Picture 19">
-            <a:extLst>
-              <a:ext uri="{FF2B5EF4-FFF2-40B4-BE49-F238E27FC236}">
-                <a16:creationId xmlns:a16="http://schemas.microsoft.com/office/drawing/2014/main" id="{FACB4D70-AA54-45F5-A0E8-1761E536E2E5}"/>
-              </a:ext>
-            </a:extLst>
-          </p:cNvPr>
-          <p:cNvPicPr>
-            <a:picLocks noChangeAspect="1"/>
-          </p:cNvPicPr>
-          <p:nvPr/>
-        </p:nvPicPr>
-        <p:blipFill>
-          <a:blip r:embed="rId4"/>
-          <a:stretch>
-            <a:fillRect/>
-          </a:stretch>
-        </p:blipFill>
-        <p:spPr>
-          <a:xfrm>
-            <a:off x="8044697" y="1958988"/>
-            <a:ext cx="3854232" cy="2607740"/>
+            <a:off x="5010149" y="5689055"/>
+            <a:ext cx="7024453" cy="660944"/>
           </a:xfrm>
           <a:prstGeom prst="rect">
             <a:avLst/>
@@ -13917,7 +14146,7 @@
     </p:spTree>
     <p:extLst>
       <p:ext uri="{BB962C8B-B14F-4D97-AF65-F5344CB8AC3E}">
-        <p14:creationId xmlns:p14="http://schemas.microsoft.com/office/powerpoint/2010/main" val="3257756258"/>
+        <p14:creationId xmlns:p14="http://schemas.microsoft.com/office/powerpoint/2010/main" val="1880209011"/>
       </p:ext>
     </p:extLst>
   </p:cSld>

</xml_diff>